<commit_message>
Adding couple more slides
</commit_message>
<xml_diff>
--- a/SQL Query Long Talk/Adatis/SQL Query Talk.pptx
+++ b/SQL Query Long Talk/Adatis/SQL Query Talk.pptx
@@ -5,12 +5,15 @@
     <p:sldMasterId id="2147483648" r:id="rId4"/>
   </p:sldMasterIdLst>
   <p:notesMasterIdLst>
-    <p:notesMasterId r:id="rId8"/>
+    <p:notesMasterId r:id="rId11"/>
   </p:notesMasterIdLst>
   <p:sldIdLst>
     <p:sldId id="4113" r:id="rId5"/>
     <p:sldId id="4116" r:id="rId6"/>
     <p:sldId id="4117" r:id="rId7"/>
+    <p:sldId id="4118" r:id="rId8"/>
+    <p:sldId id="4119" r:id="rId9"/>
+    <p:sldId id="4120" r:id="rId10"/>
   </p:sldIdLst>
   <p:sldSz cx="12192000" cy="6858000"/>
   <p:notesSz cx="6858000" cy="9144000"/>
@@ -263,7 +266,7 @@
           <a:p>
             <a:fld id="{DE126399-7E51-4369-B6E4-E2FF6F9ABB13}" type="datetimeFigureOut">
               <a:rPr lang="en-GB" smtClean="0"/>
-              <a:t>27/06/2022</a:t>
+              <a:t>22/07/2022</a:t>
             </a:fld>
             <a:endParaRPr lang="en-GB"/>
           </a:p>
@@ -680,7 +683,7 @@
           <a:p>
             <a:fld id="{97C62E4C-047F-4BB8-A7D6-928F0B6097C5}" type="datetimeFigureOut">
               <a:rPr lang="en-GB" smtClean="0"/>
-              <a:t>27/06/2022</a:t>
+              <a:t>22/07/2022</a:t>
             </a:fld>
             <a:endParaRPr lang="en-GB"/>
           </a:p>
@@ -880,7 +883,7 @@
           <a:p>
             <a:fld id="{97C62E4C-047F-4BB8-A7D6-928F0B6097C5}" type="datetimeFigureOut">
               <a:rPr lang="en-GB" smtClean="0"/>
-              <a:t>27/06/2022</a:t>
+              <a:t>22/07/2022</a:t>
             </a:fld>
             <a:endParaRPr lang="en-GB"/>
           </a:p>
@@ -1090,7 +1093,7 @@
           <a:p>
             <a:fld id="{97C62E4C-047F-4BB8-A7D6-928F0B6097C5}" type="datetimeFigureOut">
               <a:rPr lang="en-GB" smtClean="0"/>
-              <a:t>27/06/2022</a:t>
+              <a:t>22/07/2022</a:t>
             </a:fld>
             <a:endParaRPr lang="en-GB"/>
           </a:p>
@@ -1290,7 +1293,7 @@
           <a:p>
             <a:fld id="{97C62E4C-047F-4BB8-A7D6-928F0B6097C5}" type="datetimeFigureOut">
               <a:rPr lang="en-GB" smtClean="0"/>
-              <a:t>27/06/2022</a:t>
+              <a:t>22/07/2022</a:t>
             </a:fld>
             <a:endParaRPr lang="en-GB"/>
           </a:p>
@@ -1566,7 +1569,7 @@
           <a:p>
             <a:fld id="{97C62E4C-047F-4BB8-A7D6-928F0B6097C5}" type="datetimeFigureOut">
               <a:rPr lang="en-GB" smtClean="0"/>
-              <a:t>27/06/2022</a:t>
+              <a:t>22/07/2022</a:t>
             </a:fld>
             <a:endParaRPr lang="en-GB"/>
           </a:p>
@@ -1834,7 +1837,7 @@
           <a:p>
             <a:fld id="{97C62E4C-047F-4BB8-A7D6-928F0B6097C5}" type="datetimeFigureOut">
               <a:rPr lang="en-GB" smtClean="0"/>
-              <a:t>27/06/2022</a:t>
+              <a:t>22/07/2022</a:t>
             </a:fld>
             <a:endParaRPr lang="en-GB"/>
           </a:p>
@@ -2249,7 +2252,7 @@
           <a:p>
             <a:fld id="{97C62E4C-047F-4BB8-A7D6-928F0B6097C5}" type="datetimeFigureOut">
               <a:rPr lang="en-GB" smtClean="0"/>
-              <a:t>27/06/2022</a:t>
+              <a:t>22/07/2022</a:t>
             </a:fld>
             <a:endParaRPr lang="en-GB"/>
           </a:p>
@@ -2391,7 +2394,7 @@
           <a:p>
             <a:fld id="{97C62E4C-047F-4BB8-A7D6-928F0B6097C5}" type="datetimeFigureOut">
               <a:rPr lang="en-GB" smtClean="0"/>
-              <a:t>27/06/2022</a:t>
+              <a:t>22/07/2022</a:t>
             </a:fld>
             <a:endParaRPr lang="en-GB"/>
           </a:p>
@@ -2504,7 +2507,7 @@
           <a:p>
             <a:fld id="{97C62E4C-047F-4BB8-A7D6-928F0B6097C5}" type="datetimeFigureOut">
               <a:rPr lang="en-GB" smtClean="0"/>
-              <a:t>27/06/2022</a:t>
+              <a:t>22/07/2022</a:t>
             </a:fld>
             <a:endParaRPr lang="en-GB"/>
           </a:p>
@@ -2817,7 +2820,7 @@
           <a:p>
             <a:fld id="{97C62E4C-047F-4BB8-A7D6-928F0B6097C5}" type="datetimeFigureOut">
               <a:rPr lang="en-GB" smtClean="0"/>
-              <a:t>27/06/2022</a:t>
+              <a:t>22/07/2022</a:t>
             </a:fld>
             <a:endParaRPr lang="en-GB"/>
           </a:p>
@@ -3110,7 +3113,7 @@
           <a:p>
             <a:fld id="{97C62E4C-047F-4BB8-A7D6-928F0B6097C5}" type="datetimeFigureOut">
               <a:rPr lang="en-GB" smtClean="0"/>
-              <a:t>27/06/2022</a:t>
+              <a:t>22/07/2022</a:t>
             </a:fld>
             <a:endParaRPr lang="en-GB"/>
           </a:p>
@@ -3353,7 +3356,7 @@
           <a:p>
             <a:fld id="{97C62E4C-047F-4BB8-A7D6-928F0B6097C5}" type="datetimeFigureOut">
               <a:rPr lang="en-GB" smtClean="0"/>
-              <a:t>27/06/2022</a:t>
+              <a:t>22/07/2022</a:t>
             </a:fld>
             <a:endParaRPr lang="en-GB"/>
           </a:p>
@@ -4111,7 +4114,7 @@
         </p:nvSpPr>
         <p:spPr>
           <a:xfrm>
-            <a:off x="1846546" y="1204369"/>
+            <a:off x="934855" y="527475"/>
             <a:ext cx="6093912" cy="769441"/>
           </a:xfrm>
           <a:prstGeom prst="rect">
@@ -4163,8 +4166,8 @@
         </p:nvSpPr>
         <p:spPr>
           <a:xfrm>
-            <a:off x="1846546" y="2202039"/>
-            <a:ext cx="7652359" cy="3108543"/>
+            <a:off x="934855" y="1165311"/>
+            <a:ext cx="9452825" cy="5262979"/>
           </a:xfrm>
           <a:prstGeom prst="rect">
             <a:avLst/>
@@ -4188,10 +4191,9 @@
                     <a:lumMod val="75000"/>
                   </a:schemeClr>
                 </a:solidFill>
-                <a:ea typeface="Calibri"/>
                 <a:cs typeface="Calibri"/>
               </a:rPr>
-              <a:t>Real-world scenarios</a:t>
+              <a:t>For data engineers\data scientists new to SQL Server</a:t>
             </a:r>
           </a:p>
           <a:p>
@@ -4206,11 +4208,18 @@
                     <a:lumMod val="75000"/>
                   </a:schemeClr>
                 </a:solidFill>
-                <a:ea typeface="Calibri"/>
                 <a:cs typeface="Calibri"/>
               </a:rPr>
-              <a:t>Query techniques and options</a:t>
-            </a:r>
+              <a:t>Query scenarios techniques and options</a:t>
+            </a:r>
+            <a:endParaRPr lang="en-US" dirty="0">
+              <a:solidFill>
+                <a:schemeClr val="accent1">
+                  <a:lumMod val="75000"/>
+                </a:schemeClr>
+              </a:solidFill>
+              <a:cs typeface="Calibri"/>
+            </a:endParaRPr>
           </a:p>
           <a:p>
             <a:pPr marL="457200" indent="-457200">
@@ -4242,23 +4251,16 @@
                     <a:lumMod val="75000"/>
                   </a:schemeClr>
                 </a:solidFill>
-                <a:ea typeface="Calibri"/>
                 <a:cs typeface="Calibri"/>
               </a:rPr>
-              <a:t>Using </a:t>
-            </a:r>
-            <a:r>
-              <a:rPr lang="en-US" sz="2800" dirty="0" err="1">
-                <a:solidFill>
-                  <a:schemeClr val="accent1">
-                    <a:lumMod val="75000"/>
-                  </a:schemeClr>
-                </a:solidFill>
-                <a:ea typeface="Calibri"/>
-                <a:cs typeface="Calibri"/>
-              </a:rPr>
-              <a:t>AdventureWorks</a:t>
-            </a:r>
+              <a:t>Using SQL Server Management Studio – free SQL client from MS</a:t>
+            </a:r>
+          </a:p>
+          <a:p>
+            <a:pPr marL="457200" indent="-457200">
+              <a:buFont typeface="Arial" panose="020B0604020202020204" pitchFamily="34" charset="0"/>
+              <a:buChar char="•"/>
+            </a:pPr>
             <a:r>
               <a:rPr lang="en-US" sz="2800" dirty="0">
                 <a:solidFill>
@@ -4269,22 +4271,10 @@
                 <a:ea typeface="Calibri"/>
                 <a:cs typeface="Calibri"/>
               </a:rPr>
-              <a:t> database in </a:t>
-            </a:r>
-            <a:r>
-              <a:rPr lang="en-US" sz="2800">
-                <a:solidFill>
-                  <a:schemeClr val="accent1">
-                    <a:lumMod val="75000"/>
-                  </a:schemeClr>
-                </a:solidFill>
-                <a:ea typeface="Calibri"/>
-                <a:cs typeface="Calibri"/>
-              </a:rPr>
-              <a:t>GitHub here: </a:t>
-            </a:r>
-            <a:r>
-              <a:rPr lang="en-US" sz="2800">
+              <a:t>Using AdventureWorks2019 database in GitHub here: </a:t>
+            </a:r>
+            <a:r>
+              <a:rPr lang="en-US" sz="2800" dirty="0">
                 <a:solidFill>
                   <a:schemeClr val="accent1">
                     <a:lumMod val="75000"/>
@@ -4295,6 +4285,49 @@
                 <a:hlinkClick r:id="rId4"/>
               </a:rPr>
               <a:t>https://github.com/Microsoft/sql-server-samples/releases/tag/adventureworks</a:t>
+            </a:r>
+            <a:endParaRPr lang="en-US" sz="2800" dirty="0">
+              <a:solidFill>
+                <a:schemeClr val="accent1">
+                  <a:lumMod val="75000"/>
+                </a:schemeClr>
+              </a:solidFill>
+              <a:ea typeface="Calibri"/>
+              <a:cs typeface="Calibri"/>
+            </a:endParaRPr>
+          </a:p>
+          <a:p>
+            <a:pPr marL="457200" indent="-457200">
+              <a:buFont typeface="Arial" panose="020B0604020202020204" pitchFamily="34" charset="0"/>
+              <a:buChar char="•"/>
+            </a:pPr>
+            <a:r>
+              <a:rPr lang="en-US" sz="2800" dirty="0">
+                <a:solidFill>
+                  <a:schemeClr val="accent1">
+                    <a:lumMod val="75000"/>
+                  </a:schemeClr>
+                </a:solidFill>
+                <a:ea typeface="Calibri"/>
+                <a:cs typeface="Calibri"/>
+              </a:rPr>
+              <a:t>Also Stack Overflow: </a:t>
+            </a:r>
+          </a:p>
+          <a:p>
+            <a:pPr lvl="1"/>
+            <a:r>
+              <a:rPr lang="en-US" sz="2800" dirty="0">
+                <a:solidFill>
+                  <a:schemeClr val="accent1">
+                    <a:lumMod val="75000"/>
+                  </a:schemeClr>
+                </a:solidFill>
+                <a:ea typeface="Calibri"/>
+                <a:cs typeface="Calibri"/>
+                <a:hlinkClick r:id="rId5"/>
+              </a:rPr>
+              <a:t>https://www.brentozar.com/archive/2015/10/how-to-download-the-stack-overflow-database-via-bittorrent</a:t>
             </a:r>
             <a:endParaRPr lang="en-US" sz="2800" dirty="0">
               <a:solidFill>
@@ -4536,8 +4569,8 @@
         </p:nvSpPr>
         <p:spPr>
           <a:xfrm>
-            <a:off x="1846546" y="1867150"/>
-            <a:ext cx="7652359" cy="3539430"/>
+            <a:off x="1846546" y="1683313"/>
+            <a:ext cx="7652359" cy="4401205"/>
           </a:xfrm>
           <a:prstGeom prst="rect">
             <a:avLst/>
@@ -4549,6 +4582,22 @@
             <a:spAutoFit/>
           </a:bodyPr>
           <a:lstStyle/>
+          <a:p>
+            <a:pPr marL="514350" indent="-514350">
+              <a:buFont typeface="+mj-lt"/>
+              <a:buAutoNum type="arabicPeriod"/>
+            </a:pPr>
+            <a:r>
+              <a:rPr lang="en-US" sz="2800" dirty="0">
+                <a:solidFill>
+                  <a:schemeClr val="accent1">
+                    <a:lumMod val="75000"/>
+                  </a:schemeClr>
+                </a:solidFill>
+              </a:rPr>
+              <a:t>Query processing</a:t>
+            </a:r>
+          </a:p>
           <a:p>
             <a:pPr marL="514350" indent="-514350">
               <a:buFont typeface="+mj-lt"/>
@@ -4628,6 +4677,18 @@
             </a:r>
           </a:p>
           <a:p>
+            <a:r>
+              <a:rPr lang="en-US" sz="2800" dirty="0">
+                <a:solidFill>
+                  <a:schemeClr val="accent1">
+                    <a:lumMod val="75000"/>
+                  </a:schemeClr>
+                </a:solidFill>
+              </a:rPr>
+              <a:t>Break</a:t>
+            </a:r>
+          </a:p>
+          <a:p>
             <a:pPr marL="514350" indent="-514350">
               <a:buFont typeface="+mj-lt"/>
               <a:buAutoNum type="arabicPeriod"/>
@@ -4672,7 +4733,7 @@
                   </a:schemeClr>
                 </a:solidFill>
               </a:rPr>
-              <a:t>Many joins scenario</a:t>
+              <a:t>Many joins/complex queries</a:t>
             </a:r>
           </a:p>
           <a:p>
@@ -4720,6 +4781,2777 @@
     <p:extLst>
       <p:ext uri="{BB962C8B-B14F-4D97-AF65-F5344CB8AC3E}">
         <p14:creationId xmlns:p14="http://schemas.microsoft.com/office/powerpoint/2010/main" val="2887171353"/>
+      </p:ext>
+    </p:extLst>
+  </p:cSld>
+  <p:clrMapOvr>
+    <a:masterClrMapping/>
+  </p:clrMapOvr>
+</p:sld>
+</file>
+
+<file path=ppt/slides/slide4.xml><?xml version="1.0" encoding="utf-8"?>
+<p:sld xmlns:a="http://schemas.openxmlformats.org/drawingml/2006/main" xmlns:r="http://schemas.openxmlformats.org/officeDocument/2006/relationships" xmlns:p="http://schemas.openxmlformats.org/presentationml/2006/main">
+  <p:cSld>
+    <p:spTree>
+      <p:nvGrpSpPr>
+        <p:cNvPr id="1" name=""/>
+        <p:cNvGrpSpPr/>
+        <p:nvPr/>
+      </p:nvGrpSpPr>
+      <p:grpSpPr>
+        <a:xfrm>
+          <a:off x="0" y="0"/>
+          <a:ext cx="0" cy="0"/>
+          <a:chOff x="0" y="0"/>
+          <a:chExt cx="0" cy="0"/>
+        </a:xfrm>
+      </p:grpSpPr>
+      <p:pic>
+        <p:nvPicPr>
+          <p:cNvPr id="5" name="Picture 4" descr="Chart, waterfall chart&#10;&#10;Description automatically generated">
+            <a:extLst>
+              <a:ext uri="{FF2B5EF4-FFF2-40B4-BE49-F238E27FC236}">
+                <a16:creationId xmlns:a16="http://schemas.microsoft.com/office/drawing/2014/main" id="{4DB5EE1C-A705-43C8-B88E-C8A704550C63}"/>
+              </a:ext>
+            </a:extLst>
+          </p:cNvPr>
+          <p:cNvPicPr>
+            <a:picLocks noChangeAspect="1"/>
+          </p:cNvPicPr>
+          <p:nvPr/>
+        </p:nvPicPr>
+        <p:blipFill>
+          <a:blip r:embed="rId2"/>
+          <a:stretch>
+            <a:fillRect/>
+          </a:stretch>
+        </p:blipFill>
+        <p:spPr>
+          <a:xfrm>
+            <a:off x="11410950" y="0"/>
+            <a:ext cx="781050" cy="647700"/>
+          </a:xfrm>
+          <a:prstGeom prst="rect">
+            <a:avLst/>
+          </a:prstGeom>
+        </p:spPr>
+      </p:pic>
+      <p:pic>
+        <p:nvPicPr>
+          <p:cNvPr id="7" name="Picture 6">
+            <a:extLst>
+              <a:ext uri="{FF2B5EF4-FFF2-40B4-BE49-F238E27FC236}">
+                <a16:creationId xmlns:a16="http://schemas.microsoft.com/office/drawing/2014/main" id="{327441CC-4771-4F7C-B167-A2AA960CD560}"/>
+              </a:ext>
+            </a:extLst>
+          </p:cNvPr>
+          <p:cNvPicPr>
+            <a:picLocks noChangeAspect="1"/>
+          </p:cNvPicPr>
+          <p:nvPr/>
+        </p:nvPicPr>
+        <p:blipFill>
+          <a:blip r:embed="rId3"/>
+          <a:stretch>
+            <a:fillRect/>
+          </a:stretch>
+        </p:blipFill>
+        <p:spPr>
+          <a:xfrm>
+            <a:off x="244293" y="6367686"/>
+            <a:ext cx="1381125" cy="419100"/>
+          </a:xfrm>
+          <a:prstGeom prst="rect">
+            <a:avLst/>
+          </a:prstGeom>
+        </p:spPr>
+      </p:pic>
+      <p:sp>
+        <p:nvSpPr>
+          <p:cNvPr id="4" name="Title 1">
+            <a:extLst>
+              <a:ext uri="{FF2B5EF4-FFF2-40B4-BE49-F238E27FC236}">
+                <a16:creationId xmlns:a16="http://schemas.microsoft.com/office/drawing/2014/main" id="{51B2067D-1C00-4037-89FD-EC9B00ACDA7E}"/>
+              </a:ext>
+            </a:extLst>
+          </p:cNvPr>
+          <p:cNvSpPr txBox="1">
+            <a:spLocks/>
+          </p:cNvSpPr>
+          <p:nvPr/>
+        </p:nvSpPr>
+        <p:spPr>
+          <a:xfrm>
+            <a:off x="838200" y="1204369"/>
+            <a:ext cx="10515600" cy="1325563"/>
+          </a:xfrm>
+          <a:prstGeom prst="rect">
+            <a:avLst/>
+          </a:prstGeom>
+        </p:spPr>
+        <p:txBody>
+          <a:bodyPr vert="horz" lIns="91440" tIns="45720" rIns="91440" bIns="45720" rtlCol="0" anchor="b">
+            <a:normAutofit/>
+          </a:bodyPr>
+          <a:lstStyle>
+            <a:lvl1pPr algn="ctr" defTabSz="914400" rtl="0" eaLnBrk="1" latinLnBrk="0" hangingPunct="1">
+              <a:lnSpc>
+                <a:spcPct val="90000"/>
+              </a:lnSpc>
+              <a:spcBef>
+                <a:spcPct val="0"/>
+              </a:spcBef>
+              <a:buNone/>
+              <a:defRPr sz="6000" kern="1200">
+                <a:solidFill>
+                  <a:schemeClr val="tx1"/>
+                </a:solidFill>
+                <a:latin typeface="+mj-lt"/>
+                <a:ea typeface="+mj-ea"/>
+                <a:cs typeface="+mj-cs"/>
+              </a:defRPr>
+            </a:lvl1pPr>
+          </a:lstStyle>
+          <a:p>
+            <a:endParaRPr lang="en-GB" sz="8800" dirty="0">
+              <a:solidFill>
+                <a:schemeClr val="accent1">
+                  <a:lumMod val="75000"/>
+                </a:schemeClr>
+              </a:solidFill>
+            </a:endParaRPr>
+          </a:p>
+        </p:txBody>
+      </p:sp>
+      <p:sp>
+        <p:nvSpPr>
+          <p:cNvPr id="6" name="TextBox 5">
+            <a:extLst>
+              <a:ext uri="{FF2B5EF4-FFF2-40B4-BE49-F238E27FC236}">
+                <a16:creationId xmlns:a16="http://schemas.microsoft.com/office/drawing/2014/main" id="{1D8A8CF5-0852-2B3B-3504-4594D344F1A3}"/>
+              </a:ext>
+            </a:extLst>
+          </p:cNvPr>
+          <p:cNvSpPr txBox="1"/>
+          <p:nvPr/>
+        </p:nvSpPr>
+        <p:spPr>
+          <a:xfrm>
+            <a:off x="1846546" y="819648"/>
+            <a:ext cx="6093912" cy="769441"/>
+          </a:xfrm>
+          <a:prstGeom prst="rect">
+            <a:avLst/>
+          </a:prstGeom>
+          <a:noFill/>
+        </p:spPr>
+        <p:txBody>
+          <a:bodyPr wrap="square">
+            <a:spAutoFit/>
+          </a:bodyPr>
+          <a:lstStyle/>
+          <a:p>
+            <a:r>
+              <a:rPr lang="en-GB" sz="4400" dirty="0">
+                <a:solidFill>
+                  <a:schemeClr val="accent1">
+                    <a:lumMod val="75000"/>
+                  </a:schemeClr>
+                </a:solidFill>
+                <a:latin typeface="+mj-lt"/>
+              </a:rPr>
+              <a:t>Query processing</a:t>
+            </a:r>
+          </a:p>
+        </p:txBody>
+      </p:sp>
+      <p:pic>
+        <p:nvPicPr>
+          <p:cNvPr id="10" name="Graphic 9" descr="Gears outline">
+            <a:extLst>
+              <a:ext uri="{FF2B5EF4-FFF2-40B4-BE49-F238E27FC236}">
+                <a16:creationId xmlns:a16="http://schemas.microsoft.com/office/drawing/2014/main" id="{DBAF1278-9A7F-47F0-A3EE-6C530C1AB9F5}"/>
+              </a:ext>
+            </a:extLst>
+          </p:cNvPr>
+          <p:cNvPicPr>
+            <a:picLocks noChangeAspect="1"/>
+          </p:cNvPicPr>
+          <p:nvPr/>
+        </p:nvPicPr>
+        <p:blipFill>
+          <a:blip r:embed="rId4">
+            <a:extLst>
+              <a:ext uri="{28A0092B-C50C-407E-A947-70E740481C1C}">
+                <a14:useLocalDpi xmlns:a14="http://schemas.microsoft.com/office/drawing/2010/main" val="0"/>
+              </a:ext>
+              <a:ext uri="{96DAC541-7B7A-43D3-8B79-37D633B846F1}">
+                <asvg:svgBlip xmlns:asvg="http://schemas.microsoft.com/office/drawing/2016/SVG/main" r:embed="rId5"/>
+              </a:ext>
+            </a:extLst>
+          </a:blip>
+          <a:stretch>
+            <a:fillRect/>
+          </a:stretch>
+        </p:blipFill>
+        <p:spPr>
+          <a:xfrm>
+            <a:off x="4770349" y="2742638"/>
+            <a:ext cx="1372724" cy="1372724"/>
+          </a:xfrm>
+          <a:prstGeom prst="rect">
+            <a:avLst/>
+          </a:prstGeom>
+        </p:spPr>
+      </p:pic>
+      <p:pic>
+        <p:nvPicPr>
+          <p:cNvPr id="12" name="Graphic 11" descr="Database with solid fill">
+            <a:extLst>
+              <a:ext uri="{FF2B5EF4-FFF2-40B4-BE49-F238E27FC236}">
+                <a16:creationId xmlns:a16="http://schemas.microsoft.com/office/drawing/2014/main" id="{23996C2D-CD19-4320-8E92-D62D0CD9E46A}"/>
+              </a:ext>
+            </a:extLst>
+          </p:cNvPr>
+          <p:cNvPicPr>
+            <a:picLocks noChangeAspect="1"/>
+          </p:cNvPicPr>
+          <p:nvPr/>
+        </p:nvPicPr>
+        <p:blipFill>
+          <a:blip r:embed="rId6">
+            <a:extLst>
+              <a:ext uri="{28A0092B-C50C-407E-A947-70E740481C1C}">
+                <a14:useLocalDpi xmlns:a14="http://schemas.microsoft.com/office/drawing/2010/main" val="0"/>
+              </a:ext>
+              <a:ext uri="{96DAC541-7B7A-43D3-8B79-37D633B846F1}">
+                <asvg:svgBlip xmlns:asvg="http://schemas.microsoft.com/office/drawing/2016/SVG/main" r:embed="rId7"/>
+              </a:ext>
+            </a:extLst>
+          </a:blip>
+          <a:stretch>
+            <a:fillRect/>
+          </a:stretch>
+        </p:blipFill>
+        <p:spPr>
+          <a:xfrm>
+            <a:off x="3037720" y="3872550"/>
+            <a:ext cx="914400" cy="914400"/>
+          </a:xfrm>
+          <a:prstGeom prst="rect">
+            <a:avLst/>
+          </a:prstGeom>
+        </p:spPr>
+      </p:pic>
+      <p:grpSp>
+        <p:nvGrpSpPr>
+          <p:cNvPr id="26" name="Group 25">
+            <a:extLst>
+              <a:ext uri="{FF2B5EF4-FFF2-40B4-BE49-F238E27FC236}">
+                <a16:creationId xmlns:a16="http://schemas.microsoft.com/office/drawing/2014/main" id="{8355483A-91DD-4CE9-AE80-AC17E1C613B5}"/>
+              </a:ext>
+            </a:extLst>
+          </p:cNvPr>
+          <p:cNvGrpSpPr/>
+          <p:nvPr/>
+        </p:nvGrpSpPr>
+        <p:grpSpPr>
+          <a:xfrm>
+            <a:off x="3171069" y="2070140"/>
+            <a:ext cx="762095" cy="752475"/>
+            <a:chOff x="3406534" y="2230602"/>
+            <a:chExt cx="762095" cy="752475"/>
+          </a:xfrm>
+        </p:grpSpPr>
+        <p:sp>
+          <p:nvSpPr>
+            <p:cNvPr id="18" name="Freeform: Shape 17">
+              <a:extLst>
+                <a:ext uri="{FF2B5EF4-FFF2-40B4-BE49-F238E27FC236}">
+                  <a16:creationId xmlns:a16="http://schemas.microsoft.com/office/drawing/2014/main" id="{80F17267-CE60-415E-A7D3-6C70D3443527}"/>
+                </a:ext>
+              </a:extLst>
+            </p:cNvPr>
+            <p:cNvSpPr/>
+            <p:nvPr/>
+          </p:nvSpPr>
+          <p:spPr>
+            <a:xfrm>
+              <a:off x="3406534" y="2230602"/>
+              <a:ext cx="762095" cy="752475"/>
+            </a:xfrm>
+            <a:custGeom>
+              <a:avLst/>
+              <a:gdLst>
+                <a:gd name="connsiteX0" fmla="*/ 161925 w 762095"/>
+                <a:gd name="connsiteY0" fmla="*/ 190500 h 752475"/>
+                <a:gd name="connsiteX1" fmla="*/ 161925 w 762095"/>
+                <a:gd name="connsiteY1" fmla="*/ 433388 h 752475"/>
+                <a:gd name="connsiteX2" fmla="*/ 167507 w 762095"/>
+                <a:gd name="connsiteY2" fmla="*/ 446856 h 752475"/>
+                <a:gd name="connsiteX3" fmla="*/ 196891 w 762095"/>
+                <a:gd name="connsiteY3" fmla="*/ 476250 h 752475"/>
+                <a:gd name="connsiteX4" fmla="*/ 162744 w 762095"/>
+                <a:gd name="connsiteY4" fmla="*/ 510407 h 752475"/>
+                <a:gd name="connsiteX5" fmla="*/ 157163 w 762095"/>
+                <a:gd name="connsiteY5" fmla="*/ 523875 h 752475"/>
+                <a:gd name="connsiteX6" fmla="*/ 157163 w 762095"/>
+                <a:gd name="connsiteY6" fmla="*/ 652463 h 752475"/>
+                <a:gd name="connsiteX7" fmla="*/ 257175 w 762095"/>
+                <a:gd name="connsiteY7" fmla="*/ 752476 h 752475"/>
+                <a:gd name="connsiteX8" fmla="*/ 666750 w 762095"/>
+                <a:gd name="connsiteY8" fmla="*/ 752476 h 752475"/>
+                <a:gd name="connsiteX9" fmla="*/ 762095 w 762095"/>
+                <a:gd name="connsiteY9" fmla="*/ 657322 h 752475"/>
+                <a:gd name="connsiteX10" fmla="*/ 685800 w 762095"/>
+                <a:gd name="connsiteY10" fmla="*/ 563880 h 752475"/>
+                <a:gd name="connsiteX11" fmla="*/ 685800 w 762095"/>
+                <a:gd name="connsiteY11" fmla="*/ 309563 h 752475"/>
+                <a:gd name="connsiteX12" fmla="*/ 677675 w 762095"/>
+                <a:gd name="connsiteY12" fmla="*/ 293952 h 752475"/>
+                <a:gd name="connsiteX13" fmla="*/ 647024 w 762095"/>
+                <a:gd name="connsiteY13" fmla="*/ 272501 h 752475"/>
+                <a:gd name="connsiteX14" fmla="*/ 681390 w 762095"/>
+                <a:gd name="connsiteY14" fmla="*/ 231267 h 752475"/>
+                <a:gd name="connsiteX15" fmla="*/ 683085 w 762095"/>
+                <a:gd name="connsiteY15" fmla="*/ 209274 h 752475"/>
+                <a:gd name="connsiteX16" fmla="*/ 662130 w 762095"/>
+                <a:gd name="connsiteY16" fmla="*/ 174403 h 752475"/>
+                <a:gd name="connsiteX17" fmla="*/ 680180 w 762095"/>
+                <a:gd name="connsiteY17" fmla="*/ 156306 h 752475"/>
+                <a:gd name="connsiteX18" fmla="*/ 685800 w 762095"/>
+                <a:gd name="connsiteY18" fmla="*/ 142875 h 752475"/>
+                <a:gd name="connsiteX19" fmla="*/ 685800 w 762095"/>
+                <a:gd name="connsiteY19" fmla="*/ 100013 h 752475"/>
+                <a:gd name="connsiteX20" fmla="*/ 585788 w 762095"/>
+                <a:gd name="connsiteY20" fmla="*/ 0 h 752475"/>
+                <a:gd name="connsiteX21" fmla="*/ 100013 w 762095"/>
+                <a:gd name="connsiteY21" fmla="*/ 0 h 752475"/>
+                <a:gd name="connsiteX22" fmla="*/ 0 w 762095"/>
+                <a:gd name="connsiteY22" fmla="*/ 99184 h 752475"/>
+                <a:gd name="connsiteX23" fmla="*/ 37433 w 762095"/>
+                <a:gd name="connsiteY23" fmla="*/ 176546 h 752475"/>
+                <a:gd name="connsiteX24" fmla="*/ 38500 w 762095"/>
+                <a:gd name="connsiteY24" fmla="*/ 177337 h 752475"/>
+                <a:gd name="connsiteX25" fmla="*/ 79620 w 762095"/>
+                <a:gd name="connsiteY25" fmla="*/ 190586 h 752475"/>
+                <a:gd name="connsiteX26" fmla="*/ 138779 w 762095"/>
+                <a:gd name="connsiteY26" fmla="*/ 152400 h 752475"/>
+                <a:gd name="connsiteX27" fmla="*/ 142875 w 762095"/>
+                <a:gd name="connsiteY27" fmla="*/ 132169 h 752475"/>
+                <a:gd name="connsiteX28" fmla="*/ 86922 w 762095"/>
+                <a:gd name="connsiteY28" fmla="*/ 75406 h 752475"/>
+                <a:gd name="connsiteX29" fmla="*/ 85725 w 762095"/>
+                <a:gd name="connsiteY29" fmla="*/ 75410 h 752475"/>
+                <a:gd name="connsiteX30" fmla="*/ 66675 w 762095"/>
+                <a:gd name="connsiteY30" fmla="*/ 94460 h 752475"/>
+                <a:gd name="connsiteX31" fmla="*/ 85725 w 762095"/>
+                <a:gd name="connsiteY31" fmla="*/ 113510 h 752475"/>
+                <a:gd name="connsiteX32" fmla="*/ 104766 w 762095"/>
+                <a:gd name="connsiteY32" fmla="*/ 131348 h 752475"/>
+                <a:gd name="connsiteX33" fmla="*/ 104775 w 762095"/>
+                <a:gd name="connsiteY33" fmla="*/ 132169 h 752475"/>
+                <a:gd name="connsiteX34" fmla="*/ 93059 w 762095"/>
+                <a:gd name="connsiteY34" fmla="*/ 149124 h 752475"/>
+                <a:gd name="connsiteX35" fmla="*/ 60674 w 762095"/>
+                <a:gd name="connsiteY35" fmla="*/ 146314 h 752475"/>
+                <a:gd name="connsiteX36" fmla="*/ 38100 w 762095"/>
+                <a:gd name="connsiteY36" fmla="*/ 99184 h 752475"/>
+                <a:gd name="connsiteX37" fmla="*/ 100427 w 762095"/>
+                <a:gd name="connsiteY37" fmla="*/ 37686 h 752475"/>
+                <a:gd name="connsiteX38" fmla="*/ 161925 w 762095"/>
+                <a:gd name="connsiteY38" fmla="*/ 100013 h 752475"/>
+                <a:gd name="connsiteX39" fmla="*/ 161925 w 762095"/>
+                <a:gd name="connsiteY39" fmla="*/ 152400 h 752475"/>
+                <a:gd name="connsiteX40" fmla="*/ 285750 w 762095"/>
+                <a:gd name="connsiteY40" fmla="*/ 562071 h 752475"/>
+                <a:gd name="connsiteX41" fmla="*/ 251165 w 762095"/>
+                <a:gd name="connsiteY41" fmla="*/ 569624 h 752475"/>
+                <a:gd name="connsiteX42" fmla="*/ 219075 w 762095"/>
+                <a:gd name="connsiteY42" fmla="*/ 620307 h 752475"/>
+                <a:gd name="connsiteX43" fmla="*/ 275028 w 762095"/>
+                <a:gd name="connsiteY43" fmla="*/ 677070 h 752475"/>
+                <a:gd name="connsiteX44" fmla="*/ 276225 w 762095"/>
+                <a:gd name="connsiteY44" fmla="*/ 677066 h 752475"/>
+                <a:gd name="connsiteX45" fmla="*/ 295275 w 762095"/>
+                <a:gd name="connsiteY45" fmla="*/ 658016 h 752475"/>
+                <a:gd name="connsiteX46" fmla="*/ 276225 w 762095"/>
+                <a:gd name="connsiteY46" fmla="*/ 638966 h 752475"/>
+                <a:gd name="connsiteX47" fmla="*/ 257184 w 762095"/>
+                <a:gd name="connsiteY47" fmla="*/ 621128 h 752475"/>
+                <a:gd name="connsiteX48" fmla="*/ 257175 w 762095"/>
+                <a:gd name="connsiteY48" fmla="*/ 620307 h 752475"/>
+                <a:gd name="connsiteX49" fmla="*/ 268891 w 762095"/>
+                <a:gd name="connsiteY49" fmla="*/ 603352 h 752475"/>
+                <a:gd name="connsiteX50" fmla="*/ 301276 w 762095"/>
+                <a:gd name="connsiteY50" fmla="*/ 606210 h 752475"/>
+                <a:gd name="connsiteX51" fmla="*/ 323850 w 762095"/>
+                <a:gd name="connsiteY51" fmla="*/ 653292 h 752475"/>
+                <a:gd name="connsiteX52" fmla="*/ 261938 w 762095"/>
+                <a:gd name="connsiteY52" fmla="*/ 714376 h 752475"/>
+                <a:gd name="connsiteX53" fmla="*/ 257175 w 762095"/>
+                <a:gd name="connsiteY53" fmla="*/ 714376 h 752475"/>
+                <a:gd name="connsiteX54" fmla="*/ 195263 w 762095"/>
+                <a:gd name="connsiteY54" fmla="*/ 652463 h 752475"/>
+                <a:gd name="connsiteX55" fmla="*/ 195263 w 762095"/>
+                <a:gd name="connsiteY55" fmla="*/ 531772 h 752475"/>
+                <a:gd name="connsiteX56" fmla="*/ 237306 w 762095"/>
+                <a:gd name="connsiteY56" fmla="*/ 489719 h 752475"/>
+                <a:gd name="connsiteX57" fmla="*/ 237306 w 762095"/>
+                <a:gd name="connsiteY57" fmla="*/ 462782 h 752475"/>
+                <a:gd name="connsiteX58" fmla="*/ 200025 w 762095"/>
+                <a:gd name="connsiteY58" fmla="*/ 425492 h 752475"/>
+                <a:gd name="connsiteX59" fmla="*/ 200025 w 762095"/>
+                <a:gd name="connsiteY59" fmla="*/ 100013 h 752475"/>
+                <a:gd name="connsiteX60" fmla="*/ 178508 w 762095"/>
+                <a:gd name="connsiteY60" fmla="*/ 38100 h 752475"/>
+                <a:gd name="connsiteX61" fmla="*/ 585788 w 762095"/>
+                <a:gd name="connsiteY61" fmla="*/ 38100 h 752475"/>
+                <a:gd name="connsiteX62" fmla="*/ 647700 w 762095"/>
+                <a:gd name="connsiteY62" fmla="*/ 100013 h 752475"/>
+                <a:gd name="connsiteX63" fmla="*/ 647700 w 762095"/>
+                <a:gd name="connsiteY63" fmla="*/ 134979 h 752475"/>
+                <a:gd name="connsiteX64" fmla="*/ 624707 w 762095"/>
+                <a:gd name="connsiteY64" fmla="*/ 157982 h 752475"/>
+                <a:gd name="connsiteX65" fmla="*/ 621849 w 762095"/>
+                <a:gd name="connsiteY65" fmla="*/ 181252 h 752475"/>
+                <a:gd name="connsiteX66" fmla="*/ 643461 w 762095"/>
+                <a:gd name="connsiteY66" fmla="*/ 217275 h 752475"/>
+                <a:gd name="connsiteX67" fmla="*/ 604485 w 762095"/>
+                <a:gd name="connsiteY67" fmla="*/ 264034 h 752475"/>
+                <a:gd name="connsiteX68" fmla="*/ 606926 w 762095"/>
+                <a:gd name="connsiteY68" fmla="*/ 290864 h 752475"/>
+                <a:gd name="connsiteX69" fmla="*/ 608200 w 762095"/>
+                <a:gd name="connsiteY69" fmla="*/ 291837 h 752475"/>
+                <a:gd name="connsiteX70" fmla="*/ 647700 w 762095"/>
+                <a:gd name="connsiteY70" fmla="*/ 319488 h 752475"/>
+                <a:gd name="connsiteX71" fmla="*/ 647700 w 762095"/>
+                <a:gd name="connsiteY71" fmla="*/ 561976 h 752475"/>
+                <a:gd name="connsiteX72" fmla="*/ 666750 w 762095"/>
+                <a:gd name="connsiteY72" fmla="*/ 714376 h 752475"/>
+                <a:gd name="connsiteX73" fmla="*/ 340566 w 762095"/>
+                <a:gd name="connsiteY73" fmla="*/ 714376 h 752475"/>
+                <a:gd name="connsiteX74" fmla="*/ 346281 w 762095"/>
+                <a:gd name="connsiteY74" fmla="*/ 600076 h 752475"/>
+                <a:gd name="connsiteX75" fmla="*/ 666750 w 762095"/>
+                <a:gd name="connsiteY75" fmla="*/ 600076 h 752475"/>
+                <a:gd name="connsiteX76" fmla="*/ 723900 w 762095"/>
+                <a:gd name="connsiteY76" fmla="*/ 657226 h 752475"/>
+                <a:gd name="connsiteX77" fmla="*/ 666750 w 762095"/>
+                <a:gd name="connsiteY77" fmla="*/ 714376 h 752475"/>
+              </a:gdLst>
+              <a:ahLst/>
+              <a:cxnLst>
+                <a:cxn ang="0">
+                  <a:pos x="connsiteX0" y="connsiteY0"/>
+                </a:cxn>
+                <a:cxn ang="0">
+                  <a:pos x="connsiteX1" y="connsiteY1"/>
+                </a:cxn>
+                <a:cxn ang="0">
+                  <a:pos x="connsiteX2" y="connsiteY2"/>
+                </a:cxn>
+                <a:cxn ang="0">
+                  <a:pos x="connsiteX3" y="connsiteY3"/>
+                </a:cxn>
+                <a:cxn ang="0">
+                  <a:pos x="connsiteX4" y="connsiteY4"/>
+                </a:cxn>
+                <a:cxn ang="0">
+                  <a:pos x="connsiteX5" y="connsiteY5"/>
+                </a:cxn>
+                <a:cxn ang="0">
+                  <a:pos x="connsiteX6" y="connsiteY6"/>
+                </a:cxn>
+                <a:cxn ang="0">
+                  <a:pos x="connsiteX7" y="connsiteY7"/>
+                </a:cxn>
+                <a:cxn ang="0">
+                  <a:pos x="connsiteX8" y="connsiteY8"/>
+                </a:cxn>
+                <a:cxn ang="0">
+                  <a:pos x="connsiteX9" y="connsiteY9"/>
+                </a:cxn>
+                <a:cxn ang="0">
+                  <a:pos x="connsiteX10" y="connsiteY10"/>
+                </a:cxn>
+                <a:cxn ang="0">
+                  <a:pos x="connsiteX11" y="connsiteY11"/>
+                </a:cxn>
+                <a:cxn ang="0">
+                  <a:pos x="connsiteX12" y="connsiteY12"/>
+                </a:cxn>
+                <a:cxn ang="0">
+                  <a:pos x="connsiteX13" y="connsiteY13"/>
+                </a:cxn>
+                <a:cxn ang="0">
+                  <a:pos x="connsiteX14" y="connsiteY14"/>
+                </a:cxn>
+                <a:cxn ang="0">
+                  <a:pos x="connsiteX15" y="connsiteY15"/>
+                </a:cxn>
+                <a:cxn ang="0">
+                  <a:pos x="connsiteX16" y="connsiteY16"/>
+                </a:cxn>
+                <a:cxn ang="0">
+                  <a:pos x="connsiteX17" y="connsiteY17"/>
+                </a:cxn>
+                <a:cxn ang="0">
+                  <a:pos x="connsiteX18" y="connsiteY18"/>
+                </a:cxn>
+                <a:cxn ang="0">
+                  <a:pos x="connsiteX19" y="connsiteY19"/>
+                </a:cxn>
+                <a:cxn ang="0">
+                  <a:pos x="connsiteX20" y="connsiteY20"/>
+                </a:cxn>
+                <a:cxn ang="0">
+                  <a:pos x="connsiteX21" y="connsiteY21"/>
+                </a:cxn>
+                <a:cxn ang="0">
+                  <a:pos x="connsiteX22" y="connsiteY22"/>
+                </a:cxn>
+                <a:cxn ang="0">
+                  <a:pos x="connsiteX23" y="connsiteY23"/>
+                </a:cxn>
+                <a:cxn ang="0">
+                  <a:pos x="connsiteX24" y="connsiteY24"/>
+                </a:cxn>
+                <a:cxn ang="0">
+                  <a:pos x="connsiteX25" y="connsiteY25"/>
+                </a:cxn>
+                <a:cxn ang="0">
+                  <a:pos x="connsiteX26" y="connsiteY26"/>
+                </a:cxn>
+                <a:cxn ang="0">
+                  <a:pos x="connsiteX27" y="connsiteY27"/>
+                </a:cxn>
+                <a:cxn ang="0">
+                  <a:pos x="connsiteX28" y="connsiteY28"/>
+                </a:cxn>
+                <a:cxn ang="0">
+                  <a:pos x="connsiteX29" y="connsiteY29"/>
+                </a:cxn>
+                <a:cxn ang="0">
+                  <a:pos x="connsiteX30" y="connsiteY30"/>
+                </a:cxn>
+                <a:cxn ang="0">
+                  <a:pos x="connsiteX31" y="connsiteY31"/>
+                </a:cxn>
+                <a:cxn ang="0">
+                  <a:pos x="connsiteX32" y="connsiteY32"/>
+                </a:cxn>
+                <a:cxn ang="0">
+                  <a:pos x="connsiteX33" y="connsiteY33"/>
+                </a:cxn>
+                <a:cxn ang="0">
+                  <a:pos x="connsiteX34" y="connsiteY34"/>
+                </a:cxn>
+                <a:cxn ang="0">
+                  <a:pos x="connsiteX35" y="connsiteY35"/>
+                </a:cxn>
+                <a:cxn ang="0">
+                  <a:pos x="connsiteX36" y="connsiteY36"/>
+                </a:cxn>
+                <a:cxn ang="0">
+                  <a:pos x="connsiteX37" y="connsiteY37"/>
+                </a:cxn>
+                <a:cxn ang="0">
+                  <a:pos x="connsiteX38" y="connsiteY38"/>
+                </a:cxn>
+                <a:cxn ang="0">
+                  <a:pos x="connsiteX39" y="connsiteY39"/>
+                </a:cxn>
+                <a:cxn ang="0">
+                  <a:pos x="connsiteX40" y="connsiteY40"/>
+                </a:cxn>
+                <a:cxn ang="0">
+                  <a:pos x="connsiteX41" y="connsiteY41"/>
+                </a:cxn>
+                <a:cxn ang="0">
+                  <a:pos x="connsiteX42" y="connsiteY42"/>
+                </a:cxn>
+                <a:cxn ang="0">
+                  <a:pos x="connsiteX43" y="connsiteY43"/>
+                </a:cxn>
+                <a:cxn ang="0">
+                  <a:pos x="connsiteX44" y="connsiteY44"/>
+                </a:cxn>
+                <a:cxn ang="0">
+                  <a:pos x="connsiteX45" y="connsiteY45"/>
+                </a:cxn>
+                <a:cxn ang="0">
+                  <a:pos x="connsiteX46" y="connsiteY46"/>
+                </a:cxn>
+                <a:cxn ang="0">
+                  <a:pos x="connsiteX47" y="connsiteY47"/>
+                </a:cxn>
+                <a:cxn ang="0">
+                  <a:pos x="connsiteX48" y="connsiteY48"/>
+                </a:cxn>
+                <a:cxn ang="0">
+                  <a:pos x="connsiteX49" y="connsiteY49"/>
+                </a:cxn>
+                <a:cxn ang="0">
+                  <a:pos x="connsiteX50" y="connsiteY50"/>
+                </a:cxn>
+                <a:cxn ang="0">
+                  <a:pos x="connsiteX51" y="connsiteY51"/>
+                </a:cxn>
+                <a:cxn ang="0">
+                  <a:pos x="connsiteX52" y="connsiteY52"/>
+                </a:cxn>
+                <a:cxn ang="0">
+                  <a:pos x="connsiteX53" y="connsiteY53"/>
+                </a:cxn>
+                <a:cxn ang="0">
+                  <a:pos x="connsiteX54" y="connsiteY54"/>
+                </a:cxn>
+                <a:cxn ang="0">
+                  <a:pos x="connsiteX55" y="connsiteY55"/>
+                </a:cxn>
+                <a:cxn ang="0">
+                  <a:pos x="connsiteX56" y="connsiteY56"/>
+                </a:cxn>
+                <a:cxn ang="0">
+                  <a:pos x="connsiteX57" y="connsiteY57"/>
+                </a:cxn>
+                <a:cxn ang="0">
+                  <a:pos x="connsiteX58" y="connsiteY58"/>
+                </a:cxn>
+                <a:cxn ang="0">
+                  <a:pos x="connsiteX59" y="connsiteY59"/>
+                </a:cxn>
+                <a:cxn ang="0">
+                  <a:pos x="connsiteX60" y="connsiteY60"/>
+                </a:cxn>
+                <a:cxn ang="0">
+                  <a:pos x="connsiteX61" y="connsiteY61"/>
+                </a:cxn>
+                <a:cxn ang="0">
+                  <a:pos x="connsiteX62" y="connsiteY62"/>
+                </a:cxn>
+                <a:cxn ang="0">
+                  <a:pos x="connsiteX63" y="connsiteY63"/>
+                </a:cxn>
+                <a:cxn ang="0">
+                  <a:pos x="connsiteX64" y="connsiteY64"/>
+                </a:cxn>
+                <a:cxn ang="0">
+                  <a:pos x="connsiteX65" y="connsiteY65"/>
+                </a:cxn>
+                <a:cxn ang="0">
+                  <a:pos x="connsiteX66" y="connsiteY66"/>
+                </a:cxn>
+                <a:cxn ang="0">
+                  <a:pos x="connsiteX67" y="connsiteY67"/>
+                </a:cxn>
+                <a:cxn ang="0">
+                  <a:pos x="connsiteX68" y="connsiteY68"/>
+                </a:cxn>
+                <a:cxn ang="0">
+                  <a:pos x="connsiteX69" y="connsiteY69"/>
+                </a:cxn>
+                <a:cxn ang="0">
+                  <a:pos x="connsiteX70" y="connsiteY70"/>
+                </a:cxn>
+                <a:cxn ang="0">
+                  <a:pos x="connsiteX71" y="connsiteY71"/>
+                </a:cxn>
+                <a:cxn ang="0">
+                  <a:pos x="connsiteX72" y="connsiteY72"/>
+                </a:cxn>
+                <a:cxn ang="0">
+                  <a:pos x="connsiteX73" y="connsiteY73"/>
+                </a:cxn>
+                <a:cxn ang="0">
+                  <a:pos x="connsiteX74" y="connsiteY74"/>
+                </a:cxn>
+                <a:cxn ang="0">
+                  <a:pos x="connsiteX75" y="connsiteY75"/>
+                </a:cxn>
+                <a:cxn ang="0">
+                  <a:pos x="connsiteX76" y="connsiteY76"/>
+                </a:cxn>
+                <a:cxn ang="0">
+                  <a:pos x="connsiteX77" y="connsiteY77"/>
+                </a:cxn>
+              </a:cxnLst>
+              <a:rect l="l" t="t" r="r" b="b"/>
+              <a:pathLst>
+                <a:path w="762095" h="752475">
+                  <a:moveTo>
+                    <a:pt x="161925" y="190500"/>
+                  </a:moveTo>
+                  <a:lnTo>
+                    <a:pt x="161925" y="433388"/>
+                  </a:lnTo>
+                  <a:cubicBezTo>
+                    <a:pt x="161926" y="438440"/>
+                    <a:pt x="163934" y="443284"/>
+                    <a:pt x="167507" y="446856"/>
+                  </a:cubicBezTo>
+                  <a:lnTo>
+                    <a:pt x="196891" y="476250"/>
+                  </a:lnTo>
+                  <a:lnTo>
+                    <a:pt x="162744" y="510407"/>
+                  </a:lnTo>
+                  <a:cubicBezTo>
+                    <a:pt x="159171" y="513979"/>
+                    <a:pt x="157163" y="518823"/>
+                    <a:pt x="157163" y="523875"/>
+                  </a:cubicBezTo>
+                  <a:lnTo>
+                    <a:pt x="157163" y="652463"/>
+                  </a:lnTo>
+                  <a:cubicBezTo>
+                    <a:pt x="157225" y="707672"/>
+                    <a:pt x="201966" y="752413"/>
+                    <a:pt x="257175" y="752476"/>
+                  </a:cubicBezTo>
+                  <a:lnTo>
+                    <a:pt x="666750" y="752476"/>
+                  </a:lnTo>
+                  <a:cubicBezTo>
+                    <a:pt x="719355" y="752529"/>
+                    <a:pt x="762043" y="709926"/>
+                    <a:pt x="762095" y="657322"/>
+                  </a:cubicBezTo>
+                  <a:cubicBezTo>
+                    <a:pt x="762141" y="611987"/>
+                    <a:pt x="730228" y="572902"/>
+                    <a:pt x="685800" y="563880"/>
+                  </a:cubicBezTo>
+                  <a:lnTo>
+                    <a:pt x="685800" y="309563"/>
+                  </a:lnTo>
+                  <a:cubicBezTo>
+                    <a:pt x="685802" y="303345"/>
+                    <a:pt x="682769" y="297518"/>
+                    <a:pt x="677675" y="293952"/>
+                  </a:cubicBezTo>
+                  <a:lnTo>
+                    <a:pt x="647024" y="272501"/>
+                  </a:lnTo>
+                  <a:lnTo>
+                    <a:pt x="681390" y="231267"/>
+                  </a:lnTo>
+                  <a:cubicBezTo>
+                    <a:pt x="686573" y="225043"/>
+                    <a:pt x="687254" y="216220"/>
+                    <a:pt x="683085" y="209274"/>
+                  </a:cubicBezTo>
+                  <a:lnTo>
+                    <a:pt x="662130" y="174403"/>
+                  </a:lnTo>
+                  <a:lnTo>
+                    <a:pt x="680180" y="156306"/>
+                  </a:lnTo>
+                  <a:cubicBezTo>
+                    <a:pt x="683758" y="152749"/>
+                    <a:pt x="685779" y="147920"/>
+                    <a:pt x="685800" y="142875"/>
+                  </a:cubicBezTo>
+                  <a:lnTo>
+                    <a:pt x="685800" y="100013"/>
+                  </a:lnTo>
+                  <a:cubicBezTo>
+                    <a:pt x="685737" y="44804"/>
+                    <a:pt x="640996" y="63"/>
+                    <a:pt x="585788" y="0"/>
+                  </a:cubicBezTo>
+                  <a:lnTo>
+                    <a:pt x="100013" y="0"/>
+                  </a:lnTo>
+                  <a:cubicBezTo>
+                    <a:pt x="45030" y="-168"/>
+                    <a:pt x="289" y="44203"/>
+                    <a:pt x="0" y="99184"/>
+                  </a:cubicBezTo>
+                  <a:cubicBezTo>
+                    <a:pt x="-28" y="129343"/>
+                    <a:pt x="13767" y="157853"/>
+                    <a:pt x="37433" y="176546"/>
+                  </a:cubicBezTo>
+                  <a:cubicBezTo>
+                    <a:pt x="37776" y="176823"/>
+                    <a:pt x="38129" y="177089"/>
+                    <a:pt x="38500" y="177337"/>
+                  </a:cubicBezTo>
+                  <a:cubicBezTo>
+                    <a:pt x="50540" y="185833"/>
+                    <a:pt x="64884" y="190455"/>
+                    <a:pt x="79620" y="190586"/>
+                  </a:cubicBezTo>
+                  <a:close/>
+                  <a:moveTo>
+                    <a:pt x="138779" y="152400"/>
+                  </a:moveTo>
+                  <a:cubicBezTo>
+                    <a:pt x="141441" y="145985"/>
+                    <a:pt x="142832" y="139115"/>
+                    <a:pt x="142875" y="132169"/>
+                  </a:cubicBezTo>
+                  <a:cubicBezTo>
+                    <a:pt x="143099" y="101044"/>
+                    <a:pt x="118048" y="75630"/>
+                    <a:pt x="86922" y="75406"/>
+                  </a:cubicBezTo>
+                  <a:cubicBezTo>
+                    <a:pt x="86523" y="75403"/>
+                    <a:pt x="86124" y="75404"/>
+                    <a:pt x="85725" y="75410"/>
+                  </a:cubicBezTo>
+                  <a:cubicBezTo>
+                    <a:pt x="75204" y="75410"/>
+                    <a:pt x="66675" y="83939"/>
+                    <a:pt x="66675" y="94460"/>
+                  </a:cubicBezTo>
+                  <a:cubicBezTo>
+                    <a:pt x="66675" y="104981"/>
+                    <a:pt x="75204" y="113510"/>
+                    <a:pt x="85725" y="113510"/>
+                  </a:cubicBezTo>
+                  <a:cubicBezTo>
+                    <a:pt x="95909" y="113177"/>
+                    <a:pt x="104434" y="121164"/>
+                    <a:pt x="104766" y="131348"/>
+                  </a:cubicBezTo>
+                  <a:cubicBezTo>
+                    <a:pt x="104775" y="131622"/>
+                    <a:pt x="104778" y="131896"/>
+                    <a:pt x="104775" y="132169"/>
+                  </a:cubicBezTo>
+                  <a:cubicBezTo>
+                    <a:pt x="104295" y="139549"/>
+                    <a:pt x="99793" y="146065"/>
+                    <a:pt x="93059" y="149124"/>
+                  </a:cubicBezTo>
+                  <a:cubicBezTo>
+                    <a:pt x="82577" y="154260"/>
+                    <a:pt x="70115" y="153179"/>
+                    <a:pt x="60674" y="146314"/>
+                  </a:cubicBezTo>
+                  <a:cubicBezTo>
+                    <a:pt x="46403" y="134832"/>
+                    <a:pt x="38103" y="117502"/>
+                    <a:pt x="38100" y="99184"/>
+                  </a:cubicBezTo>
+                  <a:cubicBezTo>
+                    <a:pt x="38329" y="64991"/>
+                    <a:pt x="66234" y="37458"/>
+                    <a:pt x="100427" y="37686"/>
+                  </a:cubicBezTo>
+                  <a:cubicBezTo>
+                    <a:pt x="134621" y="37915"/>
+                    <a:pt x="162154" y="65819"/>
+                    <a:pt x="161925" y="100013"/>
+                  </a:cubicBezTo>
+                  <a:lnTo>
+                    <a:pt x="161925" y="152400"/>
+                  </a:lnTo>
+                  <a:close/>
+                  <a:moveTo>
+                    <a:pt x="285750" y="562071"/>
+                  </a:moveTo>
+                  <a:cubicBezTo>
+                    <a:pt x="273759" y="561518"/>
+                    <a:pt x="261834" y="564123"/>
+                    <a:pt x="251165" y="569624"/>
+                  </a:cubicBezTo>
+                  <a:cubicBezTo>
+                    <a:pt x="231872" y="579232"/>
+                    <a:pt x="219508" y="598758"/>
+                    <a:pt x="219075" y="620307"/>
+                  </a:cubicBezTo>
+                  <a:cubicBezTo>
+                    <a:pt x="218851" y="651432"/>
+                    <a:pt x="243902" y="676846"/>
+                    <a:pt x="275028" y="677070"/>
+                  </a:cubicBezTo>
+                  <a:cubicBezTo>
+                    <a:pt x="275427" y="677073"/>
+                    <a:pt x="275826" y="677072"/>
+                    <a:pt x="276225" y="677066"/>
+                  </a:cubicBezTo>
+                  <a:cubicBezTo>
+                    <a:pt x="286746" y="677066"/>
+                    <a:pt x="295275" y="668537"/>
+                    <a:pt x="295275" y="658016"/>
+                  </a:cubicBezTo>
+                  <a:cubicBezTo>
+                    <a:pt x="295275" y="647495"/>
+                    <a:pt x="286746" y="638966"/>
+                    <a:pt x="276225" y="638966"/>
+                  </a:cubicBezTo>
+                  <a:cubicBezTo>
+                    <a:pt x="266041" y="639298"/>
+                    <a:pt x="257516" y="631312"/>
+                    <a:pt x="257184" y="621128"/>
+                  </a:cubicBezTo>
+                  <a:cubicBezTo>
+                    <a:pt x="257175" y="620854"/>
+                    <a:pt x="257172" y="620580"/>
+                    <a:pt x="257175" y="620307"/>
+                  </a:cubicBezTo>
+                  <a:cubicBezTo>
+                    <a:pt x="257655" y="612927"/>
+                    <a:pt x="262158" y="606411"/>
+                    <a:pt x="268891" y="603352"/>
+                  </a:cubicBezTo>
+                  <a:cubicBezTo>
+                    <a:pt x="279382" y="598230"/>
+                    <a:pt x="291844" y="599330"/>
+                    <a:pt x="301276" y="606210"/>
+                  </a:cubicBezTo>
+                  <a:cubicBezTo>
+                    <a:pt x="315534" y="617681"/>
+                    <a:pt x="323833" y="634991"/>
+                    <a:pt x="323850" y="653292"/>
+                  </a:cubicBezTo>
+                  <a:cubicBezTo>
+                    <a:pt x="323582" y="687240"/>
+                    <a:pt x="295887" y="714566"/>
+                    <a:pt x="261938" y="714376"/>
+                  </a:cubicBezTo>
+                  <a:lnTo>
+                    <a:pt x="257175" y="714376"/>
+                  </a:lnTo>
+                  <a:cubicBezTo>
+                    <a:pt x="222999" y="714334"/>
+                    <a:pt x="195304" y="686639"/>
+                    <a:pt x="195263" y="652463"/>
+                  </a:cubicBezTo>
+                  <a:lnTo>
+                    <a:pt x="195263" y="531772"/>
+                  </a:lnTo>
+                  <a:lnTo>
+                    <a:pt x="237306" y="489719"/>
+                  </a:lnTo>
+                  <a:cubicBezTo>
+                    <a:pt x="244743" y="482280"/>
+                    <a:pt x="244743" y="470221"/>
+                    <a:pt x="237306" y="462782"/>
+                  </a:cubicBezTo>
+                  <a:lnTo>
+                    <a:pt x="200025" y="425492"/>
+                  </a:lnTo>
+                  <a:lnTo>
+                    <a:pt x="200025" y="100013"/>
+                  </a:lnTo>
+                  <a:cubicBezTo>
+                    <a:pt x="200050" y="77538"/>
+                    <a:pt x="192466" y="55716"/>
+                    <a:pt x="178508" y="38100"/>
+                  </a:cubicBezTo>
+                  <a:lnTo>
+                    <a:pt x="585788" y="38100"/>
+                  </a:lnTo>
+                  <a:cubicBezTo>
+                    <a:pt x="619963" y="38142"/>
+                    <a:pt x="647658" y="65837"/>
+                    <a:pt x="647700" y="100013"/>
+                  </a:cubicBezTo>
+                  <a:lnTo>
+                    <a:pt x="647700" y="134979"/>
+                  </a:lnTo>
+                  <a:lnTo>
+                    <a:pt x="624707" y="157982"/>
+                  </a:lnTo>
+                  <a:cubicBezTo>
+                    <a:pt x="618529" y="164165"/>
+                    <a:pt x="617351" y="173758"/>
+                    <a:pt x="621849" y="181252"/>
+                  </a:cubicBezTo>
+                  <a:lnTo>
+                    <a:pt x="643461" y="217275"/>
+                  </a:lnTo>
+                  <a:lnTo>
+                    <a:pt x="604485" y="264034"/>
+                  </a:lnTo>
+                  <a:cubicBezTo>
+                    <a:pt x="597750" y="272116"/>
+                    <a:pt x="598843" y="284128"/>
+                    <a:pt x="606926" y="290864"/>
+                  </a:cubicBezTo>
+                  <a:cubicBezTo>
+                    <a:pt x="607337" y="291205"/>
+                    <a:pt x="607762" y="291530"/>
+                    <a:pt x="608200" y="291837"/>
+                  </a:cubicBezTo>
+                  <a:lnTo>
+                    <a:pt x="647700" y="319488"/>
+                  </a:lnTo>
+                  <a:lnTo>
+                    <a:pt x="647700" y="561976"/>
+                  </a:lnTo>
+                  <a:close/>
+                  <a:moveTo>
+                    <a:pt x="666750" y="714376"/>
+                  </a:moveTo>
+                  <a:lnTo>
+                    <a:pt x="340566" y="714376"/>
+                  </a:lnTo>
+                  <a:cubicBezTo>
+                    <a:pt x="366797" y="681448"/>
+                    <a:pt x="369098" y="635455"/>
+                    <a:pt x="346281" y="600076"/>
+                  </a:cubicBezTo>
+                  <a:lnTo>
+                    <a:pt x="666750" y="600076"/>
+                  </a:lnTo>
+                  <a:cubicBezTo>
+                    <a:pt x="698313" y="600076"/>
+                    <a:pt x="723900" y="625663"/>
+                    <a:pt x="723900" y="657226"/>
+                  </a:cubicBezTo>
+                  <a:cubicBezTo>
+                    <a:pt x="723900" y="688788"/>
+                    <a:pt x="698313" y="714376"/>
+                    <a:pt x="666750" y="714376"/>
+                  </a:cubicBezTo>
+                  <a:close/>
+                </a:path>
+              </a:pathLst>
+            </a:custGeom>
+            <a:solidFill>
+              <a:srgbClr val="000000"/>
+            </a:solidFill>
+            <a:ln w="9525" cap="flat">
+              <a:noFill/>
+              <a:prstDash val="solid"/>
+              <a:miter/>
+            </a:ln>
+          </p:spPr>
+          <p:txBody>
+            <a:bodyPr rtlCol="0" anchor="ctr"/>
+            <a:lstStyle/>
+            <a:p>
+              <a:endParaRPr lang="en-GB"/>
+            </a:p>
+          </p:txBody>
+        </p:sp>
+        <p:sp>
+          <p:nvSpPr>
+            <p:cNvPr id="19" name="Freeform: Shape 18">
+              <a:extLst>
+                <a:ext uri="{FF2B5EF4-FFF2-40B4-BE49-F238E27FC236}">
+                  <a16:creationId xmlns:a16="http://schemas.microsoft.com/office/drawing/2014/main" id="{842DD056-FB1E-4C3A-BBF9-50C4567AF39A}"/>
+                </a:ext>
+              </a:extLst>
+            </p:cNvPr>
+            <p:cNvSpPr/>
+            <p:nvPr/>
+          </p:nvSpPr>
+          <p:spPr>
+            <a:xfrm>
+              <a:off x="3797060" y="2383003"/>
+              <a:ext cx="161925" cy="38100"/>
+            </a:xfrm>
+            <a:custGeom>
+              <a:avLst/>
+              <a:gdLst>
+                <a:gd name="connsiteX0" fmla="*/ 0 w 161925"/>
+                <a:gd name="connsiteY0" fmla="*/ 0 h 38100"/>
+                <a:gd name="connsiteX1" fmla="*/ 161925 w 161925"/>
+                <a:gd name="connsiteY1" fmla="*/ 0 h 38100"/>
+                <a:gd name="connsiteX2" fmla="*/ 161925 w 161925"/>
+                <a:gd name="connsiteY2" fmla="*/ 38100 h 38100"/>
+                <a:gd name="connsiteX3" fmla="*/ 0 w 161925"/>
+                <a:gd name="connsiteY3" fmla="*/ 38100 h 38100"/>
+              </a:gdLst>
+              <a:ahLst/>
+              <a:cxnLst>
+                <a:cxn ang="0">
+                  <a:pos x="connsiteX0" y="connsiteY0"/>
+                </a:cxn>
+                <a:cxn ang="0">
+                  <a:pos x="connsiteX1" y="connsiteY1"/>
+                </a:cxn>
+                <a:cxn ang="0">
+                  <a:pos x="connsiteX2" y="connsiteY2"/>
+                </a:cxn>
+                <a:cxn ang="0">
+                  <a:pos x="connsiteX3" y="connsiteY3"/>
+                </a:cxn>
+              </a:cxnLst>
+              <a:rect l="l" t="t" r="r" b="b"/>
+              <a:pathLst>
+                <a:path w="161925" h="38100">
+                  <a:moveTo>
+                    <a:pt x="0" y="0"/>
+                  </a:moveTo>
+                  <a:lnTo>
+                    <a:pt x="161925" y="0"/>
+                  </a:lnTo>
+                  <a:lnTo>
+                    <a:pt x="161925" y="38100"/>
+                  </a:lnTo>
+                  <a:lnTo>
+                    <a:pt x="0" y="38100"/>
+                  </a:lnTo>
+                  <a:close/>
+                </a:path>
+              </a:pathLst>
+            </a:custGeom>
+            <a:solidFill>
+              <a:srgbClr val="000000"/>
+            </a:solidFill>
+            <a:ln w="9525" cap="flat">
+              <a:noFill/>
+              <a:prstDash val="solid"/>
+              <a:miter/>
+            </a:ln>
+          </p:spPr>
+          <p:txBody>
+            <a:bodyPr rtlCol="0" anchor="ctr"/>
+            <a:lstStyle/>
+            <a:p>
+              <a:endParaRPr lang="en-GB"/>
+            </a:p>
+          </p:txBody>
+        </p:sp>
+        <p:sp>
+          <p:nvSpPr>
+            <p:cNvPr id="20" name="Freeform: Shape 19">
+              <a:extLst>
+                <a:ext uri="{FF2B5EF4-FFF2-40B4-BE49-F238E27FC236}">
+                  <a16:creationId xmlns:a16="http://schemas.microsoft.com/office/drawing/2014/main" id="{40647ABE-488D-4566-BBEA-AB4544A17B3A}"/>
+                </a:ext>
+              </a:extLst>
+            </p:cNvPr>
+            <p:cNvSpPr/>
+            <p:nvPr/>
+          </p:nvSpPr>
+          <p:spPr>
+            <a:xfrm>
+              <a:off x="3701810" y="2383003"/>
+              <a:ext cx="57150" cy="38100"/>
+            </a:xfrm>
+            <a:custGeom>
+              <a:avLst/>
+              <a:gdLst>
+                <a:gd name="connsiteX0" fmla="*/ 0 w 57150"/>
+                <a:gd name="connsiteY0" fmla="*/ 0 h 38100"/>
+                <a:gd name="connsiteX1" fmla="*/ 57150 w 57150"/>
+                <a:gd name="connsiteY1" fmla="*/ 0 h 38100"/>
+                <a:gd name="connsiteX2" fmla="*/ 57150 w 57150"/>
+                <a:gd name="connsiteY2" fmla="*/ 38100 h 38100"/>
+                <a:gd name="connsiteX3" fmla="*/ 0 w 57150"/>
+                <a:gd name="connsiteY3" fmla="*/ 38100 h 38100"/>
+              </a:gdLst>
+              <a:ahLst/>
+              <a:cxnLst>
+                <a:cxn ang="0">
+                  <a:pos x="connsiteX0" y="connsiteY0"/>
+                </a:cxn>
+                <a:cxn ang="0">
+                  <a:pos x="connsiteX1" y="connsiteY1"/>
+                </a:cxn>
+                <a:cxn ang="0">
+                  <a:pos x="connsiteX2" y="connsiteY2"/>
+                </a:cxn>
+                <a:cxn ang="0">
+                  <a:pos x="connsiteX3" y="connsiteY3"/>
+                </a:cxn>
+              </a:cxnLst>
+              <a:rect l="l" t="t" r="r" b="b"/>
+              <a:pathLst>
+                <a:path w="57150" h="38100">
+                  <a:moveTo>
+                    <a:pt x="0" y="0"/>
+                  </a:moveTo>
+                  <a:lnTo>
+                    <a:pt x="57150" y="0"/>
+                  </a:lnTo>
+                  <a:lnTo>
+                    <a:pt x="57150" y="38100"/>
+                  </a:lnTo>
+                  <a:lnTo>
+                    <a:pt x="0" y="38100"/>
+                  </a:lnTo>
+                  <a:close/>
+                </a:path>
+              </a:pathLst>
+            </a:custGeom>
+            <a:solidFill>
+              <a:srgbClr val="000000"/>
+            </a:solidFill>
+            <a:ln w="9525" cap="flat">
+              <a:noFill/>
+              <a:prstDash val="solid"/>
+              <a:miter/>
+            </a:ln>
+          </p:spPr>
+          <p:txBody>
+            <a:bodyPr rtlCol="0" anchor="ctr"/>
+            <a:lstStyle/>
+            <a:p>
+              <a:endParaRPr lang="en-GB"/>
+            </a:p>
+          </p:txBody>
+        </p:sp>
+        <p:sp>
+          <p:nvSpPr>
+            <p:cNvPr id="21" name="Freeform: Shape 20">
+              <a:extLst>
+                <a:ext uri="{FF2B5EF4-FFF2-40B4-BE49-F238E27FC236}">
+                  <a16:creationId xmlns:a16="http://schemas.microsoft.com/office/drawing/2014/main" id="{95A7F515-B795-4E17-B2CF-D10C1468FAF5}"/>
+                </a:ext>
+              </a:extLst>
+            </p:cNvPr>
+            <p:cNvSpPr/>
+            <p:nvPr/>
+          </p:nvSpPr>
+          <p:spPr>
+            <a:xfrm>
+              <a:off x="3797060" y="2668753"/>
+              <a:ext cx="161925" cy="38100"/>
+            </a:xfrm>
+            <a:custGeom>
+              <a:avLst/>
+              <a:gdLst>
+                <a:gd name="connsiteX0" fmla="*/ 0 w 161925"/>
+                <a:gd name="connsiteY0" fmla="*/ 0 h 38100"/>
+                <a:gd name="connsiteX1" fmla="*/ 161925 w 161925"/>
+                <a:gd name="connsiteY1" fmla="*/ 0 h 38100"/>
+                <a:gd name="connsiteX2" fmla="*/ 161925 w 161925"/>
+                <a:gd name="connsiteY2" fmla="*/ 38100 h 38100"/>
+                <a:gd name="connsiteX3" fmla="*/ 0 w 161925"/>
+                <a:gd name="connsiteY3" fmla="*/ 38100 h 38100"/>
+              </a:gdLst>
+              <a:ahLst/>
+              <a:cxnLst>
+                <a:cxn ang="0">
+                  <a:pos x="connsiteX0" y="connsiteY0"/>
+                </a:cxn>
+                <a:cxn ang="0">
+                  <a:pos x="connsiteX1" y="connsiteY1"/>
+                </a:cxn>
+                <a:cxn ang="0">
+                  <a:pos x="connsiteX2" y="connsiteY2"/>
+                </a:cxn>
+                <a:cxn ang="0">
+                  <a:pos x="connsiteX3" y="connsiteY3"/>
+                </a:cxn>
+              </a:cxnLst>
+              <a:rect l="l" t="t" r="r" b="b"/>
+              <a:pathLst>
+                <a:path w="161925" h="38100">
+                  <a:moveTo>
+                    <a:pt x="0" y="0"/>
+                  </a:moveTo>
+                  <a:lnTo>
+                    <a:pt x="161925" y="0"/>
+                  </a:lnTo>
+                  <a:lnTo>
+                    <a:pt x="161925" y="38100"/>
+                  </a:lnTo>
+                  <a:lnTo>
+                    <a:pt x="0" y="38100"/>
+                  </a:lnTo>
+                  <a:close/>
+                </a:path>
+              </a:pathLst>
+            </a:custGeom>
+            <a:solidFill>
+              <a:srgbClr val="000000"/>
+            </a:solidFill>
+            <a:ln w="9525" cap="flat">
+              <a:noFill/>
+              <a:prstDash val="solid"/>
+              <a:miter/>
+            </a:ln>
+          </p:spPr>
+          <p:txBody>
+            <a:bodyPr rtlCol="0" anchor="ctr"/>
+            <a:lstStyle/>
+            <a:p>
+              <a:endParaRPr lang="en-GB"/>
+            </a:p>
+          </p:txBody>
+        </p:sp>
+        <p:sp>
+          <p:nvSpPr>
+            <p:cNvPr id="22" name="Freeform: Shape 21">
+              <a:extLst>
+                <a:ext uri="{FF2B5EF4-FFF2-40B4-BE49-F238E27FC236}">
+                  <a16:creationId xmlns:a16="http://schemas.microsoft.com/office/drawing/2014/main" id="{E9EBFA21-21C1-4226-9B5C-FE400DBBFF79}"/>
+                </a:ext>
+              </a:extLst>
+            </p:cNvPr>
+            <p:cNvSpPr/>
+            <p:nvPr/>
+          </p:nvSpPr>
+          <p:spPr>
+            <a:xfrm>
+              <a:off x="3701810" y="2668753"/>
+              <a:ext cx="57150" cy="38100"/>
+            </a:xfrm>
+            <a:custGeom>
+              <a:avLst/>
+              <a:gdLst>
+                <a:gd name="connsiteX0" fmla="*/ 0 w 57150"/>
+                <a:gd name="connsiteY0" fmla="*/ 0 h 38100"/>
+                <a:gd name="connsiteX1" fmla="*/ 57150 w 57150"/>
+                <a:gd name="connsiteY1" fmla="*/ 0 h 38100"/>
+                <a:gd name="connsiteX2" fmla="*/ 57150 w 57150"/>
+                <a:gd name="connsiteY2" fmla="*/ 38100 h 38100"/>
+                <a:gd name="connsiteX3" fmla="*/ 0 w 57150"/>
+                <a:gd name="connsiteY3" fmla="*/ 38100 h 38100"/>
+              </a:gdLst>
+              <a:ahLst/>
+              <a:cxnLst>
+                <a:cxn ang="0">
+                  <a:pos x="connsiteX0" y="connsiteY0"/>
+                </a:cxn>
+                <a:cxn ang="0">
+                  <a:pos x="connsiteX1" y="connsiteY1"/>
+                </a:cxn>
+                <a:cxn ang="0">
+                  <a:pos x="connsiteX2" y="connsiteY2"/>
+                </a:cxn>
+                <a:cxn ang="0">
+                  <a:pos x="connsiteX3" y="connsiteY3"/>
+                </a:cxn>
+              </a:cxnLst>
+              <a:rect l="l" t="t" r="r" b="b"/>
+              <a:pathLst>
+                <a:path w="57150" h="38100">
+                  <a:moveTo>
+                    <a:pt x="0" y="0"/>
+                  </a:moveTo>
+                  <a:lnTo>
+                    <a:pt x="57150" y="0"/>
+                  </a:lnTo>
+                  <a:lnTo>
+                    <a:pt x="57150" y="38100"/>
+                  </a:lnTo>
+                  <a:lnTo>
+                    <a:pt x="0" y="38100"/>
+                  </a:lnTo>
+                  <a:close/>
+                </a:path>
+              </a:pathLst>
+            </a:custGeom>
+            <a:solidFill>
+              <a:srgbClr val="000000"/>
+            </a:solidFill>
+            <a:ln w="9525" cap="flat">
+              <a:noFill/>
+              <a:prstDash val="solid"/>
+              <a:miter/>
+            </a:ln>
+          </p:spPr>
+          <p:txBody>
+            <a:bodyPr rtlCol="0" anchor="ctr"/>
+            <a:lstStyle/>
+            <a:p>
+              <a:endParaRPr lang="en-GB"/>
+            </a:p>
+          </p:txBody>
+        </p:sp>
+        <p:sp>
+          <p:nvSpPr>
+            <p:cNvPr id="23" name="Freeform: Shape 22">
+              <a:extLst>
+                <a:ext uri="{FF2B5EF4-FFF2-40B4-BE49-F238E27FC236}">
+                  <a16:creationId xmlns:a16="http://schemas.microsoft.com/office/drawing/2014/main" id="{83933C45-9F7D-4415-B138-B5BBB648FAF4}"/>
+                </a:ext>
+              </a:extLst>
+            </p:cNvPr>
+            <p:cNvSpPr/>
+            <p:nvPr/>
+          </p:nvSpPr>
+          <p:spPr>
+            <a:xfrm>
+              <a:off x="3701810" y="2478253"/>
+              <a:ext cx="161925" cy="38100"/>
+            </a:xfrm>
+            <a:custGeom>
+              <a:avLst/>
+              <a:gdLst>
+                <a:gd name="connsiteX0" fmla="*/ 0 w 161925"/>
+                <a:gd name="connsiteY0" fmla="*/ 0 h 38100"/>
+                <a:gd name="connsiteX1" fmla="*/ 161925 w 161925"/>
+                <a:gd name="connsiteY1" fmla="*/ 0 h 38100"/>
+                <a:gd name="connsiteX2" fmla="*/ 161925 w 161925"/>
+                <a:gd name="connsiteY2" fmla="*/ 38100 h 38100"/>
+                <a:gd name="connsiteX3" fmla="*/ 0 w 161925"/>
+                <a:gd name="connsiteY3" fmla="*/ 38100 h 38100"/>
+              </a:gdLst>
+              <a:ahLst/>
+              <a:cxnLst>
+                <a:cxn ang="0">
+                  <a:pos x="connsiteX0" y="connsiteY0"/>
+                </a:cxn>
+                <a:cxn ang="0">
+                  <a:pos x="connsiteX1" y="connsiteY1"/>
+                </a:cxn>
+                <a:cxn ang="0">
+                  <a:pos x="connsiteX2" y="connsiteY2"/>
+                </a:cxn>
+                <a:cxn ang="0">
+                  <a:pos x="connsiteX3" y="connsiteY3"/>
+                </a:cxn>
+              </a:cxnLst>
+              <a:rect l="l" t="t" r="r" b="b"/>
+              <a:pathLst>
+                <a:path w="161925" h="38100">
+                  <a:moveTo>
+                    <a:pt x="0" y="0"/>
+                  </a:moveTo>
+                  <a:lnTo>
+                    <a:pt x="161925" y="0"/>
+                  </a:lnTo>
+                  <a:lnTo>
+                    <a:pt x="161925" y="38100"/>
+                  </a:lnTo>
+                  <a:lnTo>
+                    <a:pt x="0" y="38100"/>
+                  </a:lnTo>
+                  <a:close/>
+                </a:path>
+              </a:pathLst>
+            </a:custGeom>
+            <a:solidFill>
+              <a:srgbClr val="000000"/>
+            </a:solidFill>
+            <a:ln w="9525" cap="flat">
+              <a:noFill/>
+              <a:prstDash val="solid"/>
+              <a:miter/>
+            </a:ln>
+          </p:spPr>
+          <p:txBody>
+            <a:bodyPr rtlCol="0" anchor="ctr"/>
+            <a:lstStyle/>
+            <a:p>
+              <a:endParaRPr lang="en-GB"/>
+            </a:p>
+          </p:txBody>
+        </p:sp>
+        <p:sp>
+          <p:nvSpPr>
+            <p:cNvPr id="24" name="Freeform: Shape 23">
+              <a:extLst>
+                <a:ext uri="{FF2B5EF4-FFF2-40B4-BE49-F238E27FC236}">
+                  <a16:creationId xmlns:a16="http://schemas.microsoft.com/office/drawing/2014/main" id="{F709CCFC-31F3-4A50-8402-47882BB5F60C}"/>
+                </a:ext>
+              </a:extLst>
+            </p:cNvPr>
+            <p:cNvSpPr/>
+            <p:nvPr/>
+          </p:nvSpPr>
+          <p:spPr>
+            <a:xfrm>
+              <a:off x="3901835" y="2478253"/>
+              <a:ext cx="57150" cy="38100"/>
+            </a:xfrm>
+            <a:custGeom>
+              <a:avLst/>
+              <a:gdLst>
+                <a:gd name="connsiteX0" fmla="*/ 0 w 57150"/>
+                <a:gd name="connsiteY0" fmla="*/ 0 h 38100"/>
+                <a:gd name="connsiteX1" fmla="*/ 57150 w 57150"/>
+                <a:gd name="connsiteY1" fmla="*/ 0 h 38100"/>
+                <a:gd name="connsiteX2" fmla="*/ 57150 w 57150"/>
+                <a:gd name="connsiteY2" fmla="*/ 38100 h 38100"/>
+                <a:gd name="connsiteX3" fmla="*/ 0 w 57150"/>
+                <a:gd name="connsiteY3" fmla="*/ 38100 h 38100"/>
+              </a:gdLst>
+              <a:ahLst/>
+              <a:cxnLst>
+                <a:cxn ang="0">
+                  <a:pos x="connsiteX0" y="connsiteY0"/>
+                </a:cxn>
+                <a:cxn ang="0">
+                  <a:pos x="connsiteX1" y="connsiteY1"/>
+                </a:cxn>
+                <a:cxn ang="0">
+                  <a:pos x="connsiteX2" y="connsiteY2"/>
+                </a:cxn>
+                <a:cxn ang="0">
+                  <a:pos x="connsiteX3" y="connsiteY3"/>
+                </a:cxn>
+              </a:cxnLst>
+              <a:rect l="l" t="t" r="r" b="b"/>
+              <a:pathLst>
+                <a:path w="57150" h="38100">
+                  <a:moveTo>
+                    <a:pt x="0" y="0"/>
+                  </a:moveTo>
+                  <a:lnTo>
+                    <a:pt x="57150" y="0"/>
+                  </a:lnTo>
+                  <a:lnTo>
+                    <a:pt x="57150" y="38100"/>
+                  </a:lnTo>
+                  <a:lnTo>
+                    <a:pt x="0" y="38100"/>
+                  </a:lnTo>
+                  <a:close/>
+                </a:path>
+              </a:pathLst>
+            </a:custGeom>
+            <a:solidFill>
+              <a:srgbClr val="000000"/>
+            </a:solidFill>
+            <a:ln w="9525" cap="flat">
+              <a:noFill/>
+              <a:prstDash val="solid"/>
+              <a:miter/>
+            </a:ln>
+          </p:spPr>
+          <p:txBody>
+            <a:bodyPr rtlCol="0" anchor="ctr"/>
+            <a:lstStyle/>
+            <a:p>
+              <a:endParaRPr lang="en-GB"/>
+            </a:p>
+          </p:txBody>
+        </p:sp>
+        <p:sp>
+          <p:nvSpPr>
+            <p:cNvPr id="25" name="Freeform: Shape 24">
+              <a:extLst>
+                <a:ext uri="{FF2B5EF4-FFF2-40B4-BE49-F238E27FC236}">
+                  <a16:creationId xmlns:a16="http://schemas.microsoft.com/office/drawing/2014/main" id="{C41F57F4-B95B-41C4-8A29-95EDBD64FEF2}"/>
+                </a:ext>
+              </a:extLst>
+            </p:cNvPr>
+            <p:cNvSpPr/>
+            <p:nvPr/>
+          </p:nvSpPr>
+          <p:spPr>
+            <a:xfrm>
+              <a:off x="3701810" y="2573503"/>
+              <a:ext cx="257175" cy="38100"/>
+            </a:xfrm>
+            <a:custGeom>
+              <a:avLst/>
+              <a:gdLst>
+                <a:gd name="connsiteX0" fmla="*/ 0 w 257175"/>
+                <a:gd name="connsiteY0" fmla="*/ 0 h 38100"/>
+                <a:gd name="connsiteX1" fmla="*/ 257175 w 257175"/>
+                <a:gd name="connsiteY1" fmla="*/ 0 h 38100"/>
+                <a:gd name="connsiteX2" fmla="*/ 257175 w 257175"/>
+                <a:gd name="connsiteY2" fmla="*/ 38100 h 38100"/>
+                <a:gd name="connsiteX3" fmla="*/ 0 w 257175"/>
+                <a:gd name="connsiteY3" fmla="*/ 38100 h 38100"/>
+              </a:gdLst>
+              <a:ahLst/>
+              <a:cxnLst>
+                <a:cxn ang="0">
+                  <a:pos x="connsiteX0" y="connsiteY0"/>
+                </a:cxn>
+                <a:cxn ang="0">
+                  <a:pos x="connsiteX1" y="connsiteY1"/>
+                </a:cxn>
+                <a:cxn ang="0">
+                  <a:pos x="connsiteX2" y="connsiteY2"/>
+                </a:cxn>
+                <a:cxn ang="0">
+                  <a:pos x="connsiteX3" y="connsiteY3"/>
+                </a:cxn>
+              </a:cxnLst>
+              <a:rect l="l" t="t" r="r" b="b"/>
+              <a:pathLst>
+                <a:path w="257175" h="38100">
+                  <a:moveTo>
+                    <a:pt x="0" y="0"/>
+                  </a:moveTo>
+                  <a:lnTo>
+                    <a:pt x="257175" y="0"/>
+                  </a:lnTo>
+                  <a:lnTo>
+                    <a:pt x="257175" y="38100"/>
+                  </a:lnTo>
+                  <a:lnTo>
+                    <a:pt x="0" y="38100"/>
+                  </a:lnTo>
+                  <a:close/>
+                </a:path>
+              </a:pathLst>
+            </a:custGeom>
+            <a:solidFill>
+              <a:srgbClr val="000000"/>
+            </a:solidFill>
+            <a:ln w="9525" cap="flat">
+              <a:noFill/>
+              <a:prstDash val="solid"/>
+              <a:miter/>
+            </a:ln>
+          </p:spPr>
+          <p:txBody>
+            <a:bodyPr rtlCol="0" anchor="ctr"/>
+            <a:lstStyle/>
+            <a:p>
+              <a:endParaRPr lang="en-GB"/>
+            </a:p>
+          </p:txBody>
+        </p:sp>
+      </p:grpSp>
+      <p:pic>
+        <p:nvPicPr>
+          <p:cNvPr id="16" name="Graphic 15" descr="Blueprint with solid fill">
+            <a:extLst>
+              <a:ext uri="{FF2B5EF4-FFF2-40B4-BE49-F238E27FC236}">
+                <a16:creationId xmlns:a16="http://schemas.microsoft.com/office/drawing/2014/main" id="{8E5E2A08-73D4-4F9D-8206-F6AB055CF5D5}"/>
+              </a:ext>
+            </a:extLst>
+          </p:cNvPr>
+          <p:cNvPicPr>
+            <a:picLocks noChangeAspect="1"/>
+          </p:cNvPicPr>
+          <p:nvPr/>
+        </p:nvPicPr>
+        <p:blipFill>
+          <a:blip r:embed="rId8">
+            <a:extLst>
+              <a:ext uri="{28A0092B-C50C-407E-A947-70E740481C1C}">
+                <a14:useLocalDpi xmlns:a14="http://schemas.microsoft.com/office/drawing/2010/main" val="0"/>
+              </a:ext>
+              <a:ext uri="{96DAC541-7B7A-43D3-8B79-37D633B846F1}">
+                <asvg:svgBlip xmlns:asvg="http://schemas.microsoft.com/office/drawing/2016/SVG/main" r:embed="rId9"/>
+              </a:ext>
+            </a:extLst>
+          </a:blip>
+          <a:stretch>
+            <a:fillRect/>
+          </a:stretch>
+        </p:blipFill>
+        <p:spPr>
+          <a:xfrm>
+            <a:off x="6811836" y="2971800"/>
+            <a:ext cx="914400" cy="914400"/>
+          </a:xfrm>
+          <a:prstGeom prst="rect">
+            <a:avLst/>
+          </a:prstGeom>
+        </p:spPr>
+      </p:pic>
+      <p:sp>
+        <p:nvSpPr>
+          <p:cNvPr id="27" name="TextBox 26">
+            <a:extLst>
+              <a:ext uri="{FF2B5EF4-FFF2-40B4-BE49-F238E27FC236}">
+                <a16:creationId xmlns:a16="http://schemas.microsoft.com/office/drawing/2014/main" id="{8A031C9A-0A85-4856-B04A-BC4AF9999105}"/>
+              </a:ext>
+            </a:extLst>
+          </p:cNvPr>
+          <p:cNvSpPr txBox="1"/>
+          <p:nvPr/>
+        </p:nvSpPr>
+        <p:spPr>
+          <a:xfrm>
+            <a:off x="3016010" y="2902809"/>
+            <a:ext cx="1157844" cy="369332"/>
+          </a:xfrm>
+          <a:prstGeom prst="rect">
+            <a:avLst/>
+          </a:prstGeom>
+          <a:noFill/>
+        </p:spPr>
+        <p:txBody>
+          <a:bodyPr wrap="square" rtlCol="0">
+            <a:spAutoFit/>
+          </a:bodyPr>
+          <a:lstStyle/>
+          <a:p>
+            <a:r>
+              <a:rPr lang="en-GB" dirty="0"/>
+              <a:t>SQL query</a:t>
+            </a:r>
+          </a:p>
+        </p:txBody>
+      </p:sp>
+      <p:sp>
+        <p:nvSpPr>
+          <p:cNvPr id="28" name="TextBox 27">
+            <a:extLst>
+              <a:ext uri="{FF2B5EF4-FFF2-40B4-BE49-F238E27FC236}">
+                <a16:creationId xmlns:a16="http://schemas.microsoft.com/office/drawing/2014/main" id="{6E937E96-B392-443E-B607-E8999BA06A1F}"/>
+              </a:ext>
+            </a:extLst>
+          </p:cNvPr>
+          <p:cNvSpPr txBox="1"/>
+          <p:nvPr/>
+        </p:nvSpPr>
+        <p:spPr>
+          <a:xfrm>
+            <a:off x="2079321" y="4934272"/>
+            <a:ext cx="2774048" cy="369332"/>
+          </a:xfrm>
+          <a:prstGeom prst="rect">
+            <a:avLst/>
+          </a:prstGeom>
+          <a:noFill/>
+        </p:spPr>
+        <p:txBody>
+          <a:bodyPr wrap="square" rtlCol="0">
+            <a:spAutoFit/>
+          </a:bodyPr>
+          <a:lstStyle/>
+          <a:p>
+            <a:r>
+              <a:rPr lang="en-GB" dirty="0"/>
+              <a:t>Database schema, statistics</a:t>
+            </a:r>
+          </a:p>
+        </p:txBody>
+      </p:sp>
+      <p:sp>
+        <p:nvSpPr>
+          <p:cNvPr id="29" name="TextBox 28">
+            <a:extLst>
+              <a:ext uri="{FF2B5EF4-FFF2-40B4-BE49-F238E27FC236}">
+                <a16:creationId xmlns:a16="http://schemas.microsoft.com/office/drawing/2014/main" id="{A854993D-162A-465D-AFAD-6A185B73A183}"/>
+              </a:ext>
+            </a:extLst>
+          </p:cNvPr>
+          <p:cNvSpPr txBox="1"/>
+          <p:nvPr/>
+        </p:nvSpPr>
+        <p:spPr>
+          <a:xfrm>
+            <a:off x="4554186" y="4115362"/>
+            <a:ext cx="1805049" cy="369332"/>
+          </a:xfrm>
+          <a:prstGeom prst="rect">
+            <a:avLst/>
+          </a:prstGeom>
+          <a:noFill/>
+        </p:spPr>
+        <p:txBody>
+          <a:bodyPr wrap="square" rtlCol="0">
+            <a:spAutoFit/>
+          </a:bodyPr>
+          <a:lstStyle/>
+          <a:p>
+            <a:r>
+              <a:rPr lang="en-GB" dirty="0"/>
+              <a:t>Query Optimiser</a:t>
+            </a:r>
+          </a:p>
+        </p:txBody>
+      </p:sp>
+      <p:sp>
+        <p:nvSpPr>
+          <p:cNvPr id="30" name="TextBox 29">
+            <a:extLst>
+              <a:ext uri="{FF2B5EF4-FFF2-40B4-BE49-F238E27FC236}">
+                <a16:creationId xmlns:a16="http://schemas.microsoft.com/office/drawing/2014/main" id="{66CB2B20-D3D0-4EB8-B987-0D6F8DD429DA}"/>
+              </a:ext>
+            </a:extLst>
+          </p:cNvPr>
+          <p:cNvSpPr txBox="1"/>
+          <p:nvPr/>
+        </p:nvSpPr>
+        <p:spPr>
+          <a:xfrm>
+            <a:off x="6739568" y="4115362"/>
+            <a:ext cx="1219757" cy="369332"/>
+          </a:xfrm>
+          <a:prstGeom prst="rect">
+            <a:avLst/>
+          </a:prstGeom>
+          <a:noFill/>
+        </p:spPr>
+        <p:txBody>
+          <a:bodyPr wrap="none" rtlCol="0">
+            <a:spAutoFit/>
+          </a:bodyPr>
+          <a:lstStyle/>
+          <a:p>
+            <a:r>
+              <a:rPr lang="en-GB" dirty="0"/>
+              <a:t>Query Plan</a:t>
+            </a:r>
+          </a:p>
+        </p:txBody>
+      </p:sp>
+      <p:cxnSp>
+        <p:nvCxnSpPr>
+          <p:cNvPr id="32" name="Straight Arrow Connector 31">
+            <a:extLst>
+              <a:ext uri="{FF2B5EF4-FFF2-40B4-BE49-F238E27FC236}">
+                <a16:creationId xmlns:a16="http://schemas.microsoft.com/office/drawing/2014/main" id="{DC9F461B-5B78-487F-B507-69A1A5161F3B}"/>
+              </a:ext>
+            </a:extLst>
+          </p:cNvPr>
+          <p:cNvCxnSpPr>
+            <a:cxnSpLocks/>
+          </p:cNvCxnSpPr>
+          <p:nvPr/>
+        </p:nvCxnSpPr>
+        <p:spPr>
+          <a:xfrm>
+            <a:off x="4077594" y="2677254"/>
+            <a:ext cx="957544" cy="653775"/>
+          </a:xfrm>
+          <a:prstGeom prst="straightConnector1">
+            <a:avLst/>
+          </a:prstGeom>
+          <a:ln w="76200">
+            <a:solidFill>
+              <a:schemeClr val="tx1"/>
+            </a:solidFill>
+            <a:tailEnd type="triangle"/>
+          </a:ln>
+        </p:spPr>
+        <p:style>
+          <a:lnRef idx="1">
+            <a:schemeClr val="accent1"/>
+          </a:lnRef>
+          <a:fillRef idx="0">
+            <a:schemeClr val="accent1"/>
+          </a:fillRef>
+          <a:effectRef idx="0">
+            <a:schemeClr val="accent1"/>
+          </a:effectRef>
+          <a:fontRef idx="minor">
+            <a:schemeClr val="tx1"/>
+          </a:fontRef>
+        </p:style>
+      </p:cxnSp>
+      <p:cxnSp>
+        <p:nvCxnSpPr>
+          <p:cNvPr id="33" name="Straight Arrow Connector 32">
+            <a:extLst>
+              <a:ext uri="{FF2B5EF4-FFF2-40B4-BE49-F238E27FC236}">
+                <a16:creationId xmlns:a16="http://schemas.microsoft.com/office/drawing/2014/main" id="{4F7C84FD-8347-437A-BA3E-0C7A0BB7DF39}"/>
+              </a:ext>
+            </a:extLst>
+          </p:cNvPr>
+          <p:cNvCxnSpPr>
+            <a:cxnSpLocks/>
+          </p:cNvCxnSpPr>
+          <p:nvPr/>
+        </p:nvCxnSpPr>
+        <p:spPr>
+          <a:xfrm flipV="1">
+            <a:off x="3930593" y="3902656"/>
+            <a:ext cx="1104545" cy="377518"/>
+          </a:xfrm>
+          <a:prstGeom prst="straightConnector1">
+            <a:avLst/>
+          </a:prstGeom>
+          <a:ln w="76200">
+            <a:solidFill>
+              <a:schemeClr val="tx1"/>
+            </a:solidFill>
+            <a:tailEnd type="triangle"/>
+          </a:ln>
+        </p:spPr>
+        <p:style>
+          <a:lnRef idx="1">
+            <a:schemeClr val="accent1"/>
+          </a:lnRef>
+          <a:fillRef idx="0">
+            <a:schemeClr val="accent1"/>
+          </a:fillRef>
+          <a:effectRef idx="0">
+            <a:schemeClr val="accent1"/>
+          </a:effectRef>
+          <a:fontRef idx="minor">
+            <a:schemeClr val="tx1"/>
+          </a:fontRef>
+        </p:style>
+      </p:cxnSp>
+      <p:cxnSp>
+        <p:nvCxnSpPr>
+          <p:cNvPr id="36" name="Straight Arrow Connector 35">
+            <a:extLst>
+              <a:ext uri="{FF2B5EF4-FFF2-40B4-BE49-F238E27FC236}">
+                <a16:creationId xmlns:a16="http://schemas.microsoft.com/office/drawing/2014/main" id="{2A688836-8234-4B78-84C3-9A515028E589}"/>
+              </a:ext>
+            </a:extLst>
+          </p:cNvPr>
+          <p:cNvCxnSpPr>
+            <a:cxnSpLocks/>
+          </p:cNvCxnSpPr>
+          <p:nvPr/>
+        </p:nvCxnSpPr>
+        <p:spPr>
+          <a:xfrm>
+            <a:off x="5727893" y="3536326"/>
+            <a:ext cx="1011675" cy="0"/>
+          </a:xfrm>
+          <a:prstGeom prst="straightConnector1">
+            <a:avLst/>
+          </a:prstGeom>
+          <a:ln w="76200">
+            <a:solidFill>
+              <a:schemeClr val="tx1"/>
+            </a:solidFill>
+            <a:tailEnd type="triangle"/>
+          </a:ln>
+        </p:spPr>
+        <p:style>
+          <a:lnRef idx="1">
+            <a:schemeClr val="accent1"/>
+          </a:lnRef>
+          <a:fillRef idx="0">
+            <a:schemeClr val="accent1"/>
+          </a:fillRef>
+          <a:effectRef idx="0">
+            <a:schemeClr val="accent1"/>
+          </a:effectRef>
+          <a:fontRef idx="minor">
+            <a:schemeClr val="tx1"/>
+          </a:fontRef>
+        </p:style>
+      </p:cxnSp>
+      <p:cxnSp>
+        <p:nvCxnSpPr>
+          <p:cNvPr id="38" name="Straight Arrow Connector 37">
+            <a:extLst>
+              <a:ext uri="{FF2B5EF4-FFF2-40B4-BE49-F238E27FC236}">
+                <a16:creationId xmlns:a16="http://schemas.microsoft.com/office/drawing/2014/main" id="{211720E2-62C4-47C1-B3E7-50AB554C9765}"/>
+              </a:ext>
+            </a:extLst>
+          </p:cNvPr>
+          <p:cNvCxnSpPr>
+            <a:cxnSpLocks/>
+          </p:cNvCxnSpPr>
+          <p:nvPr/>
+        </p:nvCxnSpPr>
+        <p:spPr>
+          <a:xfrm>
+            <a:off x="7982225" y="3536326"/>
+            <a:ext cx="1011675" cy="0"/>
+          </a:xfrm>
+          <a:prstGeom prst="straightConnector1">
+            <a:avLst/>
+          </a:prstGeom>
+          <a:ln w="76200">
+            <a:solidFill>
+              <a:schemeClr val="tx1"/>
+            </a:solidFill>
+            <a:tailEnd type="triangle"/>
+          </a:ln>
+        </p:spPr>
+        <p:style>
+          <a:lnRef idx="1">
+            <a:schemeClr val="accent1"/>
+          </a:lnRef>
+          <a:fillRef idx="0">
+            <a:schemeClr val="accent1"/>
+          </a:fillRef>
+          <a:effectRef idx="0">
+            <a:schemeClr val="accent1"/>
+          </a:effectRef>
+          <a:fontRef idx="minor">
+            <a:schemeClr val="tx1"/>
+          </a:fontRef>
+        </p:style>
+      </p:cxnSp>
+      <p:pic>
+        <p:nvPicPr>
+          <p:cNvPr id="40" name="Graphic 39" descr="Hierarchy with solid fill">
+            <a:extLst>
+              <a:ext uri="{FF2B5EF4-FFF2-40B4-BE49-F238E27FC236}">
+                <a16:creationId xmlns:a16="http://schemas.microsoft.com/office/drawing/2014/main" id="{4EFFE8AD-3FFC-45C8-9A42-6BB027A059C8}"/>
+              </a:ext>
+            </a:extLst>
+          </p:cNvPr>
+          <p:cNvPicPr>
+            <a:picLocks noChangeAspect="1"/>
+          </p:cNvPicPr>
+          <p:nvPr/>
+        </p:nvPicPr>
+        <p:blipFill>
+          <a:blip r:embed="rId10">
+            <a:extLst>
+              <a:ext uri="{28A0092B-C50C-407E-A947-70E740481C1C}">
+                <a14:useLocalDpi xmlns:a14="http://schemas.microsoft.com/office/drawing/2010/main" val="0"/>
+              </a:ext>
+              <a:ext uri="{96DAC541-7B7A-43D3-8B79-37D633B846F1}">
+                <asvg:svgBlip xmlns:asvg="http://schemas.microsoft.com/office/drawing/2016/SVG/main" r:embed="rId11"/>
+              </a:ext>
+            </a:extLst>
+          </a:blip>
+          <a:stretch>
+            <a:fillRect/>
+          </a:stretch>
+        </p:blipFill>
+        <p:spPr>
+          <a:xfrm>
+            <a:off x="9249889" y="3090444"/>
+            <a:ext cx="914400" cy="914400"/>
+          </a:xfrm>
+          <a:prstGeom prst="rect">
+            <a:avLst/>
+          </a:prstGeom>
+        </p:spPr>
+      </p:pic>
+      <p:sp>
+        <p:nvSpPr>
+          <p:cNvPr id="41" name="TextBox 40">
+            <a:extLst>
+              <a:ext uri="{FF2B5EF4-FFF2-40B4-BE49-F238E27FC236}">
+                <a16:creationId xmlns:a16="http://schemas.microsoft.com/office/drawing/2014/main" id="{6C69649B-54AE-4A98-AEFC-8BCEBC050223}"/>
+              </a:ext>
+            </a:extLst>
+          </p:cNvPr>
+          <p:cNvSpPr txBox="1"/>
+          <p:nvPr/>
+        </p:nvSpPr>
+        <p:spPr>
+          <a:xfrm>
+            <a:off x="8804309" y="4115362"/>
+            <a:ext cx="1805559" cy="369332"/>
+          </a:xfrm>
+          <a:prstGeom prst="rect">
+            <a:avLst/>
+          </a:prstGeom>
+          <a:noFill/>
+        </p:spPr>
+        <p:txBody>
+          <a:bodyPr wrap="none" rtlCol="0">
+            <a:spAutoFit/>
+          </a:bodyPr>
+          <a:lstStyle/>
+          <a:p>
+            <a:r>
+              <a:rPr lang="en-GB" dirty="0"/>
+              <a:t>Relational Engine</a:t>
+            </a:r>
+          </a:p>
+        </p:txBody>
+      </p:sp>
+    </p:spTree>
+    <p:extLst>
+      <p:ext uri="{BB962C8B-B14F-4D97-AF65-F5344CB8AC3E}">
+        <p14:creationId xmlns:p14="http://schemas.microsoft.com/office/powerpoint/2010/main" val="2396669295"/>
+      </p:ext>
+    </p:extLst>
+  </p:cSld>
+  <p:clrMapOvr>
+    <a:masterClrMapping/>
+  </p:clrMapOvr>
+</p:sld>
+</file>
+
+<file path=ppt/slides/slide5.xml><?xml version="1.0" encoding="utf-8"?>
+<p:sld xmlns:a="http://schemas.openxmlformats.org/drawingml/2006/main" xmlns:r="http://schemas.openxmlformats.org/officeDocument/2006/relationships" xmlns:p="http://schemas.openxmlformats.org/presentationml/2006/main">
+  <p:cSld>
+    <p:spTree>
+      <p:nvGrpSpPr>
+        <p:cNvPr id="1" name=""/>
+        <p:cNvGrpSpPr/>
+        <p:nvPr/>
+      </p:nvGrpSpPr>
+      <p:grpSpPr>
+        <a:xfrm>
+          <a:off x="0" y="0"/>
+          <a:ext cx="0" cy="0"/>
+          <a:chOff x="0" y="0"/>
+          <a:chExt cx="0" cy="0"/>
+        </a:xfrm>
+      </p:grpSpPr>
+      <p:pic>
+        <p:nvPicPr>
+          <p:cNvPr id="5" name="Picture 4" descr="Chart, waterfall chart&#10;&#10;Description automatically generated">
+            <a:extLst>
+              <a:ext uri="{FF2B5EF4-FFF2-40B4-BE49-F238E27FC236}">
+                <a16:creationId xmlns:a16="http://schemas.microsoft.com/office/drawing/2014/main" id="{4DB5EE1C-A705-43C8-B88E-C8A704550C63}"/>
+              </a:ext>
+            </a:extLst>
+          </p:cNvPr>
+          <p:cNvPicPr>
+            <a:picLocks noChangeAspect="1"/>
+          </p:cNvPicPr>
+          <p:nvPr/>
+        </p:nvPicPr>
+        <p:blipFill>
+          <a:blip r:embed="rId2"/>
+          <a:stretch>
+            <a:fillRect/>
+          </a:stretch>
+        </p:blipFill>
+        <p:spPr>
+          <a:xfrm>
+            <a:off x="11410950" y="0"/>
+            <a:ext cx="781050" cy="647700"/>
+          </a:xfrm>
+          <a:prstGeom prst="rect">
+            <a:avLst/>
+          </a:prstGeom>
+        </p:spPr>
+      </p:pic>
+      <p:pic>
+        <p:nvPicPr>
+          <p:cNvPr id="7" name="Picture 6">
+            <a:extLst>
+              <a:ext uri="{FF2B5EF4-FFF2-40B4-BE49-F238E27FC236}">
+                <a16:creationId xmlns:a16="http://schemas.microsoft.com/office/drawing/2014/main" id="{327441CC-4771-4F7C-B167-A2AA960CD560}"/>
+              </a:ext>
+            </a:extLst>
+          </p:cNvPr>
+          <p:cNvPicPr>
+            <a:picLocks noChangeAspect="1"/>
+          </p:cNvPicPr>
+          <p:nvPr/>
+        </p:nvPicPr>
+        <p:blipFill>
+          <a:blip r:embed="rId3"/>
+          <a:stretch>
+            <a:fillRect/>
+          </a:stretch>
+        </p:blipFill>
+        <p:spPr>
+          <a:xfrm>
+            <a:off x="244293" y="6367686"/>
+            <a:ext cx="1381125" cy="419100"/>
+          </a:xfrm>
+          <a:prstGeom prst="rect">
+            <a:avLst/>
+          </a:prstGeom>
+        </p:spPr>
+      </p:pic>
+      <p:sp>
+        <p:nvSpPr>
+          <p:cNvPr id="4" name="Title 1">
+            <a:extLst>
+              <a:ext uri="{FF2B5EF4-FFF2-40B4-BE49-F238E27FC236}">
+                <a16:creationId xmlns:a16="http://schemas.microsoft.com/office/drawing/2014/main" id="{51B2067D-1C00-4037-89FD-EC9B00ACDA7E}"/>
+              </a:ext>
+            </a:extLst>
+          </p:cNvPr>
+          <p:cNvSpPr txBox="1">
+            <a:spLocks/>
+          </p:cNvSpPr>
+          <p:nvPr/>
+        </p:nvSpPr>
+        <p:spPr>
+          <a:xfrm>
+            <a:off x="862544" y="1203159"/>
+            <a:ext cx="10515600" cy="1325563"/>
+          </a:xfrm>
+          <a:prstGeom prst="rect">
+            <a:avLst/>
+          </a:prstGeom>
+        </p:spPr>
+        <p:txBody>
+          <a:bodyPr vert="horz" lIns="91440" tIns="45720" rIns="91440" bIns="45720" rtlCol="0" anchor="b">
+            <a:normAutofit/>
+          </a:bodyPr>
+          <a:lstStyle>
+            <a:lvl1pPr algn="ctr" defTabSz="914400" rtl="0" eaLnBrk="1" latinLnBrk="0" hangingPunct="1">
+              <a:lnSpc>
+                <a:spcPct val="90000"/>
+              </a:lnSpc>
+              <a:spcBef>
+                <a:spcPct val="0"/>
+              </a:spcBef>
+              <a:buNone/>
+              <a:defRPr sz="6000" kern="1200">
+                <a:solidFill>
+                  <a:schemeClr val="tx1"/>
+                </a:solidFill>
+                <a:latin typeface="+mj-lt"/>
+                <a:ea typeface="+mj-ea"/>
+                <a:cs typeface="+mj-cs"/>
+              </a:defRPr>
+            </a:lvl1pPr>
+          </a:lstStyle>
+          <a:p>
+            <a:endParaRPr lang="en-GB" sz="8800" dirty="0">
+              <a:solidFill>
+                <a:schemeClr val="accent1">
+                  <a:lumMod val="75000"/>
+                </a:schemeClr>
+              </a:solidFill>
+            </a:endParaRPr>
+          </a:p>
+        </p:txBody>
+      </p:sp>
+      <p:sp>
+        <p:nvSpPr>
+          <p:cNvPr id="6" name="TextBox 5">
+            <a:extLst>
+              <a:ext uri="{FF2B5EF4-FFF2-40B4-BE49-F238E27FC236}">
+                <a16:creationId xmlns:a16="http://schemas.microsoft.com/office/drawing/2014/main" id="{1D8A8CF5-0852-2B3B-3504-4594D344F1A3}"/>
+              </a:ext>
+            </a:extLst>
+          </p:cNvPr>
+          <p:cNvSpPr txBox="1"/>
+          <p:nvPr/>
+        </p:nvSpPr>
+        <p:spPr>
+          <a:xfrm>
+            <a:off x="497619" y="323850"/>
+            <a:ext cx="6093912" cy="769441"/>
+          </a:xfrm>
+          <a:prstGeom prst="rect">
+            <a:avLst/>
+          </a:prstGeom>
+          <a:noFill/>
+        </p:spPr>
+        <p:txBody>
+          <a:bodyPr wrap="square">
+            <a:spAutoFit/>
+          </a:bodyPr>
+          <a:lstStyle/>
+          <a:p>
+            <a:r>
+              <a:rPr lang="en-GB" sz="4400" dirty="0">
+                <a:solidFill>
+                  <a:schemeClr val="accent1">
+                    <a:lumMod val="75000"/>
+                  </a:schemeClr>
+                </a:solidFill>
+                <a:latin typeface="+mj-lt"/>
+              </a:rPr>
+              <a:t>Indexing &amp; Heaps</a:t>
+            </a:r>
+          </a:p>
+        </p:txBody>
+      </p:sp>
+      <p:sp>
+        <p:nvSpPr>
+          <p:cNvPr id="14" name="TextBox 13">
+            <a:extLst>
+              <a:ext uri="{FF2B5EF4-FFF2-40B4-BE49-F238E27FC236}">
+                <a16:creationId xmlns:a16="http://schemas.microsoft.com/office/drawing/2014/main" id="{BFD461A1-5F5B-4DEB-BAC5-EA19C7CB05BF}"/>
+              </a:ext>
+            </a:extLst>
+          </p:cNvPr>
+          <p:cNvSpPr txBox="1"/>
+          <p:nvPr/>
+        </p:nvSpPr>
+        <p:spPr>
+          <a:xfrm>
+            <a:off x="497619" y="922158"/>
+            <a:ext cx="7966924" cy="369332"/>
+          </a:xfrm>
+          <a:prstGeom prst="rect">
+            <a:avLst/>
+          </a:prstGeom>
+          <a:noFill/>
+        </p:spPr>
+        <p:txBody>
+          <a:bodyPr wrap="square">
+            <a:spAutoFit/>
+          </a:bodyPr>
+          <a:lstStyle/>
+          <a:p>
+            <a:r>
+              <a:rPr lang="en-GB" dirty="0"/>
+              <a:t>From: https://www.sqlshack.com/clustered-index-vs-heap/</a:t>
+            </a:r>
+          </a:p>
+        </p:txBody>
+      </p:sp>
+      <p:sp>
+        <p:nvSpPr>
+          <p:cNvPr id="15" name="TextBox 14">
+            <a:extLst>
+              <a:ext uri="{FF2B5EF4-FFF2-40B4-BE49-F238E27FC236}">
+                <a16:creationId xmlns:a16="http://schemas.microsoft.com/office/drawing/2014/main" id="{992AEE51-4DA9-4E12-AAF4-301495B72DA5}"/>
+              </a:ext>
+            </a:extLst>
+          </p:cNvPr>
+          <p:cNvSpPr txBox="1"/>
+          <p:nvPr/>
+        </p:nvSpPr>
+        <p:spPr>
+          <a:xfrm>
+            <a:off x="497619" y="1572491"/>
+            <a:ext cx="765402" cy="369332"/>
+          </a:xfrm>
+          <a:prstGeom prst="rect">
+            <a:avLst/>
+          </a:prstGeom>
+          <a:noFill/>
+        </p:spPr>
+        <p:txBody>
+          <a:bodyPr wrap="none" rtlCol="0">
+            <a:spAutoFit/>
+          </a:bodyPr>
+          <a:lstStyle/>
+          <a:p>
+            <a:r>
+              <a:rPr lang="en-GB" dirty="0"/>
+              <a:t>Heaps</a:t>
+            </a:r>
+          </a:p>
+        </p:txBody>
+      </p:sp>
+      <p:sp>
+        <p:nvSpPr>
+          <p:cNvPr id="16" name="TextBox 15">
+            <a:extLst>
+              <a:ext uri="{FF2B5EF4-FFF2-40B4-BE49-F238E27FC236}">
+                <a16:creationId xmlns:a16="http://schemas.microsoft.com/office/drawing/2014/main" id="{094262C8-5EBC-4E30-9BF8-15949E12E8F6}"/>
+              </a:ext>
+            </a:extLst>
+          </p:cNvPr>
+          <p:cNvSpPr txBox="1"/>
+          <p:nvPr/>
+        </p:nvSpPr>
+        <p:spPr>
+          <a:xfrm>
+            <a:off x="497619" y="3650405"/>
+            <a:ext cx="1639873" cy="369332"/>
+          </a:xfrm>
+          <a:prstGeom prst="rect">
+            <a:avLst/>
+          </a:prstGeom>
+          <a:noFill/>
+        </p:spPr>
+        <p:txBody>
+          <a:bodyPr wrap="none" rtlCol="0">
+            <a:spAutoFit/>
+          </a:bodyPr>
+          <a:lstStyle/>
+          <a:p>
+            <a:r>
+              <a:rPr lang="en-GB" dirty="0"/>
+              <a:t>Clustered Index</a:t>
+            </a:r>
+          </a:p>
+        </p:txBody>
+      </p:sp>
+      <p:pic>
+        <p:nvPicPr>
+          <p:cNvPr id="18" name="Picture 17" descr="Diagram&#10;&#10;Description automatically generated">
+            <a:extLst>
+              <a:ext uri="{FF2B5EF4-FFF2-40B4-BE49-F238E27FC236}">
+                <a16:creationId xmlns:a16="http://schemas.microsoft.com/office/drawing/2014/main" id="{31655EC7-EFA7-4CEA-A871-22DA4CC84290}"/>
+              </a:ext>
+            </a:extLst>
+          </p:cNvPr>
+          <p:cNvPicPr>
+            <a:picLocks noChangeAspect="1"/>
+          </p:cNvPicPr>
+          <p:nvPr/>
+        </p:nvPicPr>
+        <p:blipFill>
+          <a:blip r:embed="rId4">
+            <a:extLst>
+              <a:ext uri="{28A0092B-C50C-407E-A947-70E740481C1C}">
+                <a14:useLocalDpi xmlns:a14="http://schemas.microsoft.com/office/drawing/2010/main" val="0"/>
+              </a:ext>
+            </a:extLst>
+          </a:blip>
+          <a:stretch>
+            <a:fillRect/>
+          </a:stretch>
+        </p:blipFill>
+        <p:spPr>
+          <a:xfrm>
+            <a:off x="2151177" y="3730489"/>
+            <a:ext cx="4399095" cy="2445534"/>
+          </a:xfrm>
+          <a:prstGeom prst="rect">
+            <a:avLst/>
+          </a:prstGeom>
+        </p:spPr>
+      </p:pic>
+      <p:pic>
+        <p:nvPicPr>
+          <p:cNvPr id="20" name="Picture 19" descr="A picture containing table&#10;&#10;Description automatically generated">
+            <a:extLst>
+              <a:ext uri="{FF2B5EF4-FFF2-40B4-BE49-F238E27FC236}">
+                <a16:creationId xmlns:a16="http://schemas.microsoft.com/office/drawing/2014/main" id="{FB09AF29-5337-4599-AD3E-0B3C79297097}"/>
+              </a:ext>
+            </a:extLst>
+          </p:cNvPr>
+          <p:cNvPicPr>
+            <a:picLocks noChangeAspect="1"/>
+          </p:cNvPicPr>
+          <p:nvPr/>
+        </p:nvPicPr>
+        <p:blipFill>
+          <a:blip r:embed="rId5">
+            <a:extLst>
+              <a:ext uri="{28A0092B-C50C-407E-A947-70E740481C1C}">
+                <a14:useLocalDpi xmlns:a14="http://schemas.microsoft.com/office/drawing/2010/main" val="0"/>
+              </a:ext>
+            </a:extLst>
+          </a:blip>
+          <a:stretch>
+            <a:fillRect/>
+          </a:stretch>
+        </p:blipFill>
+        <p:spPr>
+          <a:xfrm>
+            <a:off x="2912255" y="1664255"/>
+            <a:ext cx="3102597" cy="1881568"/>
+          </a:xfrm>
+          <a:prstGeom prst="rect">
+            <a:avLst/>
+          </a:prstGeom>
+        </p:spPr>
+      </p:pic>
+    </p:spTree>
+    <p:extLst>
+      <p:ext uri="{BB962C8B-B14F-4D97-AF65-F5344CB8AC3E}">
+        <p14:creationId xmlns:p14="http://schemas.microsoft.com/office/powerpoint/2010/main" val="1363816700"/>
+      </p:ext>
+    </p:extLst>
+  </p:cSld>
+  <p:clrMapOvr>
+    <a:masterClrMapping/>
+  </p:clrMapOvr>
+</p:sld>
+</file>
+
+<file path=ppt/slides/slide6.xml><?xml version="1.0" encoding="utf-8"?>
+<p:sld xmlns:a="http://schemas.openxmlformats.org/drawingml/2006/main" xmlns:r="http://schemas.openxmlformats.org/officeDocument/2006/relationships" xmlns:p="http://schemas.openxmlformats.org/presentationml/2006/main">
+  <p:cSld>
+    <p:spTree>
+      <p:nvGrpSpPr>
+        <p:cNvPr id="1" name=""/>
+        <p:cNvGrpSpPr/>
+        <p:nvPr/>
+      </p:nvGrpSpPr>
+      <p:grpSpPr>
+        <a:xfrm>
+          <a:off x="0" y="0"/>
+          <a:ext cx="0" cy="0"/>
+          <a:chOff x="0" y="0"/>
+          <a:chExt cx="0" cy="0"/>
+        </a:xfrm>
+      </p:grpSpPr>
+      <p:sp>
+        <p:nvSpPr>
+          <p:cNvPr id="2" name="Title 1">
+            <a:extLst>
+              <a:ext uri="{FF2B5EF4-FFF2-40B4-BE49-F238E27FC236}">
+                <a16:creationId xmlns:a16="http://schemas.microsoft.com/office/drawing/2014/main" id="{8773CFB3-1893-5009-C46F-C75C97695369}"/>
+              </a:ext>
+            </a:extLst>
+          </p:cNvPr>
+          <p:cNvSpPr>
+            <a:spLocks noGrp="1"/>
+          </p:cNvSpPr>
+          <p:nvPr>
+            <p:ph type="title"/>
+          </p:nvPr>
+        </p:nvSpPr>
+        <p:spPr/>
+        <p:txBody>
+          <a:bodyPr>
+            <a:normAutofit/>
+          </a:bodyPr>
+          <a:lstStyle/>
+          <a:p>
+            <a:r>
+              <a:rPr lang="en-GB" dirty="0">
+                <a:solidFill>
+                  <a:schemeClr val="accent5">
+                    <a:lumMod val="50000"/>
+                  </a:schemeClr>
+                </a:solidFill>
+                <a:cs typeface="Calibri Light"/>
+              </a:rPr>
+              <a:t>Thank you!</a:t>
+            </a:r>
+            <a:br>
+              <a:rPr lang="en-GB" dirty="0">
+                <a:solidFill>
+                  <a:schemeClr val="accent5">
+                    <a:lumMod val="50000"/>
+                  </a:schemeClr>
+                </a:solidFill>
+                <a:cs typeface="Calibri Light"/>
+              </a:rPr>
+            </a:br>
+            <a:r>
+              <a:rPr lang="en-GB" dirty="0">
+                <a:solidFill>
+                  <a:schemeClr val="accent5">
+                    <a:lumMod val="50000"/>
+                  </a:schemeClr>
+                </a:solidFill>
+                <a:cs typeface="Calibri Light"/>
+              </a:rPr>
+              <a:t>Questions?</a:t>
+            </a:r>
+          </a:p>
+        </p:txBody>
+      </p:sp>
+      <p:sp>
+        <p:nvSpPr>
+          <p:cNvPr id="6" name="TextBox 5">
+            <a:extLst>
+              <a:ext uri="{FF2B5EF4-FFF2-40B4-BE49-F238E27FC236}">
+                <a16:creationId xmlns:a16="http://schemas.microsoft.com/office/drawing/2014/main" id="{F1BB9305-D99D-1A77-388E-9B7DAF3B14F5}"/>
+              </a:ext>
+            </a:extLst>
+          </p:cNvPr>
+          <p:cNvSpPr txBox="1"/>
+          <p:nvPr/>
+        </p:nvSpPr>
+        <p:spPr>
+          <a:xfrm>
+            <a:off x="840059" y="1868448"/>
+            <a:ext cx="5078759" cy="1938992"/>
+          </a:xfrm>
+          <a:prstGeom prst="rect">
+            <a:avLst/>
+          </a:prstGeom>
+          <a:noFill/>
+        </p:spPr>
+        <p:txBody>
+          <a:bodyPr rot="0" spcFirstLastPara="0" vertOverflow="overflow" horzOverflow="overflow" vert="horz" wrap="square" lIns="91440" tIns="45720" rIns="91440" bIns="45720" numCol="1" spcCol="0" rtlCol="0" fromWordArt="0" anchor="t" anchorCtr="0" forceAA="0" compatLnSpc="1">
+            <a:prstTxWarp prst="textNoShape">
+              <a:avLst/>
+            </a:prstTxWarp>
+            <a:spAutoFit/>
+          </a:bodyPr>
+          <a:lstStyle/>
+          <a:p>
+            <a:pPr marL="0" marR="0" lvl="0" indent="0" algn="l" defTabSz="914400" rtl="0" eaLnBrk="1" fontAlgn="auto" latinLnBrk="0" hangingPunct="1">
+              <a:lnSpc>
+                <a:spcPct val="100000"/>
+              </a:lnSpc>
+              <a:spcBef>
+                <a:spcPts val="0"/>
+              </a:spcBef>
+              <a:spcAft>
+                <a:spcPts val="0"/>
+              </a:spcAft>
+              <a:buClrTx/>
+              <a:buSzTx/>
+              <a:buFontTx/>
+              <a:buNone/>
+              <a:tabLst/>
+              <a:defRPr/>
+            </a:pPr>
+            <a:r>
+              <a:rPr kumimoji="0" lang="en-US" sz="2000" b="0" i="0" u="none" strike="noStrike" kern="1200" cap="none" spc="0" normalizeH="0" baseline="0" noProof="0" dirty="0">
+                <a:ln>
+                  <a:noFill/>
+                </a:ln>
+                <a:solidFill>
+                  <a:srgbClr val="2F5496"/>
+                </a:solidFill>
+                <a:effectLst/>
+                <a:uLnTx/>
+                <a:uFillTx/>
+                <a:latin typeface="Calibri Light"/>
+                <a:ea typeface="+mn-ea"/>
+                <a:cs typeface="Calibri"/>
+                <a:hlinkClick r:id="rId2">
+                  <a:extLst>
+                    <a:ext uri="{A12FA001-AC4F-418D-AE19-62706E023703}">
+                      <ahyp:hlinkClr xmlns:ahyp="http://schemas.microsoft.com/office/drawing/2018/hyperlinkcolor" val="tx"/>
+                    </a:ext>
+                  </a:extLst>
+                </a:hlinkClick>
+              </a:rPr>
+              <a:t>phil.austin@adatis.co.uk</a:t>
+            </a:r>
+            <a:endParaRPr kumimoji="0" lang="en-US" sz="2000" b="0" i="0" u="none" strike="noStrike" kern="1200" cap="none" spc="0" normalizeH="0" baseline="0" noProof="0" dirty="0">
+              <a:ln>
+                <a:noFill/>
+              </a:ln>
+              <a:solidFill>
+                <a:srgbClr val="2F5496"/>
+              </a:solidFill>
+              <a:effectLst/>
+              <a:uLnTx/>
+              <a:uFillTx/>
+              <a:latin typeface="Calibri Light"/>
+              <a:ea typeface="+mn-ea"/>
+              <a:cs typeface="Calibri Light"/>
+            </a:endParaRPr>
+          </a:p>
+          <a:p>
+            <a:pPr marL="0" marR="0" lvl="0" indent="0" algn="l" defTabSz="914400" rtl="0" eaLnBrk="1" fontAlgn="auto" latinLnBrk="0" hangingPunct="1">
+              <a:lnSpc>
+                <a:spcPct val="100000"/>
+              </a:lnSpc>
+              <a:spcBef>
+                <a:spcPts val="0"/>
+              </a:spcBef>
+              <a:spcAft>
+                <a:spcPts val="0"/>
+              </a:spcAft>
+              <a:buClrTx/>
+              <a:buSzTx/>
+              <a:buFontTx/>
+              <a:buNone/>
+              <a:tabLst/>
+              <a:defRPr/>
+            </a:pPr>
+            <a:endParaRPr kumimoji="0" lang="en-US" sz="2000" b="0" i="0" u="none" strike="noStrike" kern="1200" cap="none" spc="0" normalizeH="0" baseline="0" noProof="0" dirty="0">
+              <a:ln>
+                <a:noFill/>
+              </a:ln>
+              <a:solidFill>
+                <a:srgbClr val="2F5496"/>
+              </a:solidFill>
+              <a:effectLst/>
+              <a:uLnTx/>
+              <a:uFillTx/>
+              <a:latin typeface="Calibri Light"/>
+              <a:ea typeface="+mn-ea"/>
+              <a:cs typeface="Calibri"/>
+            </a:endParaRPr>
+          </a:p>
+          <a:p>
+            <a:pPr marL="0" marR="0" lvl="0" indent="0" algn="l" defTabSz="914400" rtl="0" eaLnBrk="1" fontAlgn="auto" latinLnBrk="0" hangingPunct="1">
+              <a:lnSpc>
+                <a:spcPct val="100000"/>
+              </a:lnSpc>
+              <a:spcBef>
+                <a:spcPts val="0"/>
+              </a:spcBef>
+              <a:spcAft>
+                <a:spcPts val="0"/>
+              </a:spcAft>
+              <a:buClrTx/>
+              <a:buSzTx/>
+              <a:buFontTx/>
+              <a:buNone/>
+              <a:tabLst/>
+              <a:defRPr/>
+            </a:pPr>
+            <a:r>
+              <a:rPr kumimoji="0" lang="en-US" sz="2000" b="0" i="0" u="none" strike="noStrike" kern="1200" cap="none" spc="0" normalizeH="0" baseline="0" noProof="0" dirty="0">
+                <a:ln>
+                  <a:noFill/>
+                </a:ln>
+                <a:solidFill>
+                  <a:srgbClr val="2F5496"/>
+                </a:solidFill>
+                <a:effectLst/>
+                <a:uLnTx/>
+                <a:uFillTx/>
+                <a:latin typeface="Calibri Light"/>
+                <a:ea typeface="+mn-lt"/>
+                <a:cs typeface="Calibri" panose="020F0502020204030204"/>
+              </a:rPr>
+              <a:t>www.linkedin.com/in/phil-austin-44147415</a:t>
+            </a:r>
+            <a:endParaRPr kumimoji="0" lang="en-US" sz="1800" b="0" i="0" u="none" strike="noStrike" kern="1200" cap="none" spc="0" normalizeH="0" baseline="0" noProof="0" dirty="0">
+              <a:ln>
+                <a:noFill/>
+              </a:ln>
+              <a:solidFill>
+                <a:srgbClr val="2F5496"/>
+              </a:solidFill>
+              <a:effectLst/>
+              <a:uLnTx/>
+              <a:uFillTx/>
+              <a:latin typeface="Calibri Light"/>
+              <a:ea typeface="+mn-ea"/>
+              <a:cs typeface="Calibri Light"/>
+            </a:endParaRPr>
+          </a:p>
+          <a:p>
+            <a:pPr marL="0" marR="0" lvl="0" indent="0" algn="l" defTabSz="914400" rtl="0" eaLnBrk="1" fontAlgn="auto" latinLnBrk="0" hangingPunct="1">
+              <a:lnSpc>
+                <a:spcPct val="100000"/>
+              </a:lnSpc>
+              <a:spcBef>
+                <a:spcPts val="0"/>
+              </a:spcBef>
+              <a:spcAft>
+                <a:spcPts val="0"/>
+              </a:spcAft>
+              <a:buClrTx/>
+              <a:buSzTx/>
+              <a:buFontTx/>
+              <a:buNone/>
+              <a:tabLst/>
+              <a:defRPr/>
+            </a:pPr>
+            <a:endParaRPr kumimoji="0" lang="en-US" sz="2000" b="0" i="0" u="none" strike="noStrike" kern="1200" cap="none" spc="0" normalizeH="0" baseline="0" noProof="0" dirty="0">
+              <a:ln>
+                <a:noFill/>
+              </a:ln>
+              <a:solidFill>
+                <a:srgbClr val="2F5496"/>
+              </a:solidFill>
+              <a:effectLst/>
+              <a:uLnTx/>
+              <a:uFillTx/>
+              <a:latin typeface="Calibri Light"/>
+              <a:ea typeface="+mn-ea"/>
+              <a:cs typeface="Calibri"/>
+            </a:endParaRPr>
+          </a:p>
+          <a:p>
+            <a:pPr marL="0" marR="0" lvl="0" indent="0" algn="l" defTabSz="914400" rtl="0" eaLnBrk="1" fontAlgn="auto" latinLnBrk="0" hangingPunct="1">
+              <a:lnSpc>
+                <a:spcPct val="100000"/>
+              </a:lnSpc>
+              <a:spcBef>
+                <a:spcPts val="0"/>
+              </a:spcBef>
+              <a:spcAft>
+                <a:spcPts val="0"/>
+              </a:spcAft>
+              <a:buClrTx/>
+              <a:buSzTx/>
+              <a:buFontTx/>
+              <a:buNone/>
+              <a:tabLst/>
+              <a:defRPr/>
+            </a:pPr>
+            <a:endParaRPr kumimoji="0" lang="en-US" sz="2000" b="0" i="0" u="none" strike="noStrike" kern="1200" cap="none" spc="0" normalizeH="0" baseline="0" noProof="0" dirty="0">
+              <a:ln>
+                <a:noFill/>
+              </a:ln>
+              <a:solidFill>
+                <a:srgbClr val="2F5496"/>
+              </a:solidFill>
+              <a:effectLst/>
+              <a:uLnTx/>
+              <a:uFillTx/>
+              <a:latin typeface="Calibri Light"/>
+              <a:ea typeface="+mn-ea"/>
+              <a:cs typeface="Calibri"/>
+            </a:endParaRPr>
+          </a:p>
+          <a:p>
+            <a:pPr marL="0" marR="0" lvl="0" indent="0" algn="l" defTabSz="914400" rtl="0" eaLnBrk="1" fontAlgn="auto" latinLnBrk="0" hangingPunct="1">
+              <a:lnSpc>
+                <a:spcPct val="100000"/>
+              </a:lnSpc>
+              <a:spcBef>
+                <a:spcPts val="0"/>
+              </a:spcBef>
+              <a:spcAft>
+                <a:spcPts val="0"/>
+              </a:spcAft>
+              <a:buClrTx/>
+              <a:buSzTx/>
+              <a:buFontTx/>
+              <a:buNone/>
+              <a:tabLst/>
+              <a:defRPr/>
+            </a:pPr>
+            <a:endParaRPr kumimoji="0" lang="en-US" sz="2000" b="0" i="0" u="none" strike="noStrike" kern="1200" cap="none" spc="0" normalizeH="0" baseline="0" noProof="0" dirty="0">
+              <a:ln>
+                <a:noFill/>
+              </a:ln>
+              <a:solidFill>
+                <a:srgbClr val="2F5496"/>
+              </a:solidFill>
+              <a:effectLst/>
+              <a:uLnTx/>
+              <a:uFillTx/>
+              <a:latin typeface="Calibri Light"/>
+              <a:ea typeface="+mn-ea"/>
+              <a:cs typeface="Calibri"/>
+            </a:endParaRPr>
+          </a:p>
+        </p:txBody>
+      </p:sp>
+    </p:spTree>
+    <p:extLst>
+      <p:ext uri="{BB962C8B-B14F-4D97-AF65-F5344CB8AC3E}">
+        <p14:creationId xmlns:p14="http://schemas.microsoft.com/office/powerpoint/2010/main" val="2317781933"/>
       </p:ext>
     </p:extLst>
   </p:cSld>
@@ -5320,6 +8152,21 @@
 </file>
 
 <file path=customXml/item1.xml><?xml version="1.0" encoding="utf-8"?>
+<?mso-contentType ?>
+<FormTemplates xmlns="http://schemas.microsoft.com/sharepoint/v3/contenttype/forms">
+  <Display>DocumentLibraryForm</Display>
+  <Edit>DocumentLibraryForm</Edit>
+  <New>DocumentLibraryForm</New>
+</FormTemplates>
+</file>
+
+<file path=customXml/item2.xml><?xml version="1.0" encoding="utf-8"?>
+<p:properties xmlns:p="http://schemas.microsoft.com/office/2006/metadata/properties" xmlns:xsi="http://www.w3.org/2001/XMLSchema-instance" xmlns:pc="http://schemas.microsoft.com/office/infopath/2007/PartnerControls">
+  <documentManagement/>
+</p:properties>
+</file>
+
+<file path=customXml/item3.xml><?xml version="1.0" encoding="utf-8"?>
 <ct:contentTypeSchema xmlns:ct="http://schemas.microsoft.com/office/2006/metadata/contentType" xmlns:ma="http://schemas.microsoft.com/office/2006/metadata/properties/metaAttributes" ct:_="" ma:_="" ma:contentTypeName="Document" ma:contentTypeID="0x010100FBB1B5EA396249469A265E2AFFA3D1CF" ma:contentTypeVersion="13" ma:contentTypeDescription="Create a new document." ma:contentTypeScope="" ma:versionID="b141d291728b83a8fcc03a75883dd331">
   <xsd:schema xmlns:xsd="http://www.w3.org/2001/XMLSchema" xmlns:xs="http://www.w3.org/2001/XMLSchema" xmlns:p="http://schemas.microsoft.com/office/2006/metadata/properties" xmlns:ns2="8ec32435-9101-4c97-8a3c-ccfc4b09d27a" xmlns:ns3="b8fcd98d-34a5-443c-9231-e77d014cc831" targetNamespace="http://schemas.microsoft.com/office/2006/metadata/properties" ma:root="true" ma:fieldsID="34a7861a6873264f6183a02b9797b2f1" ns2:_="" ns3:_="">
     <xsd:import namespace="8ec32435-9101-4c97-8a3c-ccfc4b09d27a"/>
@@ -5542,36 +8389,10 @@
 </ct:contentTypeSchema>
 </file>
 
-<file path=customXml/item2.xml><?xml version="1.0" encoding="utf-8"?>
-<p:properties xmlns:p="http://schemas.microsoft.com/office/2006/metadata/properties" xmlns:xsi="http://www.w3.org/2001/XMLSchema-instance" xmlns:pc="http://schemas.microsoft.com/office/infopath/2007/PartnerControls">
-  <documentManagement/>
-</p:properties>
-</file>
-
-<file path=customXml/item3.xml><?xml version="1.0" encoding="utf-8"?>
-<?mso-contentType ?>
-<FormTemplates xmlns="http://schemas.microsoft.com/sharepoint/v3/contenttype/forms">
-  <Display>DocumentLibraryForm</Display>
-  <Edit>DocumentLibraryForm</Edit>
-  <New>DocumentLibraryForm</New>
-</FormTemplates>
-</file>
-
 <file path=customXml/itemProps1.xml><?xml version="1.0" encoding="utf-8"?>
-<ds:datastoreItem xmlns:ds="http://schemas.openxmlformats.org/officeDocument/2006/customXml" ds:itemID="{3DF60798-9B04-43FD-B5B0-24F9F1212BF9}">
+<ds:datastoreItem xmlns:ds="http://schemas.openxmlformats.org/officeDocument/2006/customXml" ds:itemID="{2CB33670-BA4C-497A-82C4-7472D857EF72}">
   <ds:schemaRefs>
-    <ds:schemaRef ds:uri="8ec32435-9101-4c97-8a3c-ccfc4b09d27a"/>
-    <ds:schemaRef ds:uri="b8fcd98d-34a5-443c-9231-e77d014cc831"/>
-    <ds:schemaRef ds:uri="http://purl.org/dc/elements/1.1/"/>
-    <ds:schemaRef ds:uri="http://purl.org/dc/terms/"/>
-    <ds:schemaRef ds:uri="http://schemas.microsoft.com/internal/obd"/>
-    <ds:schemaRef ds:uri="http://schemas.microsoft.com/office/2006/documentManagement/types"/>
-    <ds:schemaRef ds:uri="http://schemas.microsoft.com/office/2006/metadata/contentType"/>
-    <ds:schemaRef ds:uri="http://schemas.microsoft.com/office/2006/metadata/properties"/>
-    <ds:schemaRef ds:uri="http://schemas.microsoft.com/office/2006/metadata/properties/metaAttributes"/>
-    <ds:schemaRef ds:uri="http://schemas.microsoft.com/office/infopath/2007/PartnerControls"/>
-    <ds:schemaRef ds:uri="http://schemas.openxmlformats.org/package/2006/metadata/core-properties"/>
-    <ds:schemaRef ds:uri="http://www.w3.org/2001/XMLSchema"/>
+    <ds:schemaRef ds:uri="http://schemas.microsoft.com/sharepoint/v3/contenttype/forms"/>
   </ds:schemaRefs>
 </ds:datastoreItem>
 </file>
@@ -5594,9 +8415,20 @@
 </file>
 
 <file path=customXml/itemProps3.xml><?xml version="1.0" encoding="utf-8"?>
-<ds:datastoreItem xmlns:ds="http://schemas.openxmlformats.org/officeDocument/2006/customXml" ds:itemID="{2CB33670-BA4C-497A-82C4-7472D857EF72}">
+<ds:datastoreItem xmlns:ds="http://schemas.openxmlformats.org/officeDocument/2006/customXml" ds:itemID="{3DF60798-9B04-43FD-B5B0-24F9F1212BF9}">
   <ds:schemaRefs>
-    <ds:schemaRef ds:uri="http://schemas.microsoft.com/sharepoint/v3/contenttype/forms"/>
+    <ds:schemaRef ds:uri="8ec32435-9101-4c97-8a3c-ccfc4b09d27a"/>
+    <ds:schemaRef ds:uri="b8fcd98d-34a5-443c-9231-e77d014cc831"/>
+    <ds:schemaRef ds:uri="http://purl.org/dc/elements/1.1/"/>
+    <ds:schemaRef ds:uri="http://purl.org/dc/terms/"/>
+    <ds:schemaRef ds:uri="http://schemas.microsoft.com/internal/obd"/>
+    <ds:schemaRef ds:uri="http://schemas.microsoft.com/office/2006/documentManagement/types"/>
+    <ds:schemaRef ds:uri="http://schemas.microsoft.com/office/2006/metadata/contentType"/>
+    <ds:schemaRef ds:uri="http://schemas.microsoft.com/office/2006/metadata/properties"/>
+    <ds:schemaRef ds:uri="http://schemas.microsoft.com/office/2006/metadata/properties/metaAttributes"/>
+    <ds:schemaRef ds:uri="http://schemas.microsoft.com/office/infopath/2007/PartnerControls"/>
+    <ds:schemaRef ds:uri="http://schemas.openxmlformats.org/package/2006/metadata/core-properties"/>
+    <ds:schemaRef ds:uri="http://www.w3.org/2001/XMLSchema"/>
   </ds:schemaRefs>
 </ds:datastoreItem>
 </file>
</xml_diff>

<commit_message>
Changes for December talk for Adatis
</commit_message>
<xml_diff>
--- a/SQL Query Long Talk/Adatis/SQL Query Talk.pptx
+++ b/SQL Query Long Talk/Adatis/SQL Query Talk.pptx
@@ -5,7 +5,7 @@
     <p:sldMasterId id="2147483648" r:id="rId4"/>
   </p:sldMasterIdLst>
   <p:notesMasterIdLst>
-    <p:notesMasterId r:id="rId11"/>
+    <p:notesMasterId r:id="rId12"/>
   </p:notesMasterIdLst>
   <p:sldIdLst>
     <p:sldId id="4113" r:id="rId5"/>
@@ -13,7 +13,8 @@
     <p:sldId id="4117" r:id="rId7"/>
     <p:sldId id="4118" r:id="rId8"/>
     <p:sldId id="4119" r:id="rId9"/>
-    <p:sldId id="4120" r:id="rId10"/>
+    <p:sldId id="6022" r:id="rId10"/>
+    <p:sldId id="4120" r:id="rId11"/>
   </p:sldIdLst>
   <p:sldSz cx="12192000" cy="6858000"/>
   <p:notesSz cx="6858000" cy="9144000"/>
@@ -266,7 +267,7 @@
           <a:p>
             <a:fld id="{DE126399-7E51-4369-B6E4-E2FF6F9ABB13}" type="datetimeFigureOut">
               <a:rPr lang="en-GB" smtClean="0"/>
-              <a:t>22/07/2022</a:t>
+              <a:t>05/12/2022</a:t>
             </a:fld>
             <a:endParaRPr lang="en-GB"/>
           </a:p>
@@ -683,7 +684,7 @@
           <a:p>
             <a:fld id="{97C62E4C-047F-4BB8-A7D6-928F0B6097C5}" type="datetimeFigureOut">
               <a:rPr lang="en-GB" smtClean="0"/>
-              <a:t>22/07/2022</a:t>
+              <a:t>05/12/2022</a:t>
             </a:fld>
             <a:endParaRPr lang="en-GB"/>
           </a:p>
@@ -883,7 +884,7 @@
           <a:p>
             <a:fld id="{97C62E4C-047F-4BB8-A7D6-928F0B6097C5}" type="datetimeFigureOut">
               <a:rPr lang="en-GB" smtClean="0"/>
-              <a:t>22/07/2022</a:t>
+              <a:t>05/12/2022</a:t>
             </a:fld>
             <a:endParaRPr lang="en-GB"/>
           </a:p>
@@ -1093,7 +1094,7 @@
           <a:p>
             <a:fld id="{97C62E4C-047F-4BB8-A7D6-928F0B6097C5}" type="datetimeFigureOut">
               <a:rPr lang="en-GB" smtClean="0"/>
-              <a:t>22/07/2022</a:t>
+              <a:t>05/12/2022</a:t>
             </a:fld>
             <a:endParaRPr lang="en-GB"/>
           </a:p>
@@ -1293,7 +1294,7 @@
           <a:p>
             <a:fld id="{97C62E4C-047F-4BB8-A7D6-928F0B6097C5}" type="datetimeFigureOut">
               <a:rPr lang="en-GB" smtClean="0"/>
-              <a:t>22/07/2022</a:t>
+              <a:t>05/12/2022</a:t>
             </a:fld>
             <a:endParaRPr lang="en-GB"/>
           </a:p>
@@ -1569,7 +1570,7 @@
           <a:p>
             <a:fld id="{97C62E4C-047F-4BB8-A7D6-928F0B6097C5}" type="datetimeFigureOut">
               <a:rPr lang="en-GB" smtClean="0"/>
-              <a:t>22/07/2022</a:t>
+              <a:t>05/12/2022</a:t>
             </a:fld>
             <a:endParaRPr lang="en-GB"/>
           </a:p>
@@ -1837,7 +1838,7 @@
           <a:p>
             <a:fld id="{97C62E4C-047F-4BB8-A7D6-928F0B6097C5}" type="datetimeFigureOut">
               <a:rPr lang="en-GB" smtClean="0"/>
-              <a:t>22/07/2022</a:t>
+              <a:t>05/12/2022</a:t>
             </a:fld>
             <a:endParaRPr lang="en-GB"/>
           </a:p>
@@ -2252,7 +2253,7 @@
           <a:p>
             <a:fld id="{97C62E4C-047F-4BB8-A7D6-928F0B6097C5}" type="datetimeFigureOut">
               <a:rPr lang="en-GB" smtClean="0"/>
-              <a:t>22/07/2022</a:t>
+              <a:t>05/12/2022</a:t>
             </a:fld>
             <a:endParaRPr lang="en-GB"/>
           </a:p>
@@ -2394,7 +2395,7 @@
           <a:p>
             <a:fld id="{97C62E4C-047F-4BB8-A7D6-928F0B6097C5}" type="datetimeFigureOut">
               <a:rPr lang="en-GB" smtClean="0"/>
-              <a:t>22/07/2022</a:t>
+              <a:t>05/12/2022</a:t>
             </a:fld>
             <a:endParaRPr lang="en-GB"/>
           </a:p>
@@ -2507,7 +2508,7 @@
           <a:p>
             <a:fld id="{97C62E4C-047F-4BB8-A7D6-928F0B6097C5}" type="datetimeFigureOut">
               <a:rPr lang="en-GB" smtClean="0"/>
-              <a:t>22/07/2022</a:t>
+              <a:t>05/12/2022</a:t>
             </a:fld>
             <a:endParaRPr lang="en-GB"/>
           </a:p>
@@ -2820,7 +2821,7 @@
           <a:p>
             <a:fld id="{97C62E4C-047F-4BB8-A7D6-928F0B6097C5}" type="datetimeFigureOut">
               <a:rPr lang="en-GB" smtClean="0"/>
-              <a:t>22/07/2022</a:t>
+              <a:t>05/12/2022</a:t>
             </a:fld>
             <a:endParaRPr lang="en-GB"/>
           </a:p>
@@ -3113,7 +3114,7 @@
           <a:p>
             <a:fld id="{97C62E4C-047F-4BB8-A7D6-928F0B6097C5}" type="datetimeFigureOut">
               <a:rPr lang="en-GB" smtClean="0"/>
-              <a:t>22/07/2022</a:t>
+              <a:t>05/12/2022</a:t>
             </a:fld>
             <a:endParaRPr lang="en-GB"/>
           </a:p>
@@ -3356,7 +3357,7 @@
           <a:p>
             <a:fld id="{97C62E4C-047F-4BB8-A7D6-928F0B6097C5}" type="datetimeFigureOut">
               <a:rPr lang="en-GB" smtClean="0"/>
-              <a:t>22/07/2022</a:t>
+              <a:t>05/12/2022</a:t>
             </a:fld>
             <a:endParaRPr lang="en-GB"/>
           </a:p>
@@ -7203,6 +7204,444 @@
 </file>
 
 <file path=ppt/slides/slide6.xml><?xml version="1.0" encoding="utf-8"?>
+<p:sld xmlns:a="http://schemas.openxmlformats.org/drawingml/2006/main" xmlns:r="http://schemas.openxmlformats.org/officeDocument/2006/relationships" xmlns:p="http://schemas.openxmlformats.org/presentationml/2006/main">
+  <p:cSld>
+    <p:spTree>
+      <p:nvGrpSpPr>
+        <p:cNvPr id="1" name=""/>
+        <p:cNvGrpSpPr/>
+        <p:nvPr/>
+      </p:nvGrpSpPr>
+      <p:grpSpPr>
+        <a:xfrm>
+          <a:off x="0" y="0"/>
+          <a:ext cx="0" cy="0"/>
+          <a:chOff x="0" y="0"/>
+          <a:chExt cx="0" cy="0"/>
+        </a:xfrm>
+      </p:grpSpPr>
+      <p:pic>
+        <p:nvPicPr>
+          <p:cNvPr id="8" name="Picture 7" descr="Logo&#10;&#10;Description automatically generated">
+            <a:extLst>
+              <a:ext uri="{FF2B5EF4-FFF2-40B4-BE49-F238E27FC236}">
+                <a16:creationId xmlns:a16="http://schemas.microsoft.com/office/drawing/2014/main" id="{129F0CF2-304D-416B-866C-BA37B4C36177}"/>
+              </a:ext>
+            </a:extLst>
+          </p:cNvPr>
+          <p:cNvPicPr>
+            <a:picLocks noChangeAspect="1"/>
+          </p:cNvPicPr>
+          <p:nvPr/>
+        </p:nvPicPr>
+        <p:blipFill>
+          <a:blip r:embed="rId2" cstate="print">
+            <a:extLst>
+              <a:ext uri="{28A0092B-C50C-407E-A947-70E740481C1C}">
+                <a14:useLocalDpi xmlns:a14="http://schemas.microsoft.com/office/drawing/2010/main" val="0"/>
+              </a:ext>
+            </a:extLst>
+          </a:blip>
+          <a:stretch>
+            <a:fillRect/>
+          </a:stretch>
+        </p:blipFill>
+        <p:spPr>
+          <a:xfrm>
+            <a:off x="10695974" y="6378766"/>
+            <a:ext cx="1270065" cy="317936"/>
+          </a:xfrm>
+          <a:prstGeom prst="rect">
+            <a:avLst/>
+          </a:prstGeom>
+        </p:spPr>
+      </p:pic>
+      <p:sp>
+        <p:nvSpPr>
+          <p:cNvPr id="30" name="Title 1">
+            <a:extLst>
+              <a:ext uri="{FF2B5EF4-FFF2-40B4-BE49-F238E27FC236}">
+                <a16:creationId xmlns:a16="http://schemas.microsoft.com/office/drawing/2014/main" id="{A5D4985B-D68F-4485-80C8-D410D243C483}"/>
+              </a:ext>
+            </a:extLst>
+          </p:cNvPr>
+          <p:cNvSpPr txBox="1">
+            <a:spLocks/>
+          </p:cNvSpPr>
+          <p:nvPr/>
+        </p:nvSpPr>
+        <p:spPr>
+          <a:xfrm>
+            <a:off x="202465" y="404664"/>
+            <a:ext cx="10515600" cy="903635"/>
+          </a:xfrm>
+          <a:prstGeom prst="rect">
+            <a:avLst/>
+          </a:prstGeom>
+        </p:spPr>
+        <p:txBody>
+          <a:bodyPr vert="horz" lIns="91440" tIns="45720" rIns="91440" bIns="45720" rtlCol="0" anchor="b">
+            <a:normAutofit lnSpcReduction="10000"/>
+          </a:bodyPr>
+          <a:lstStyle>
+            <a:lvl1pPr algn="ctr" defTabSz="914400" rtl="0" eaLnBrk="1" latinLnBrk="0" hangingPunct="1">
+              <a:lnSpc>
+                <a:spcPct val="90000"/>
+              </a:lnSpc>
+              <a:spcBef>
+                <a:spcPct val="0"/>
+              </a:spcBef>
+              <a:buNone/>
+              <a:defRPr sz="6000" kern="1200">
+                <a:solidFill>
+                  <a:schemeClr val="tx1"/>
+                </a:solidFill>
+                <a:latin typeface="+mj-lt"/>
+                <a:ea typeface="+mj-ea"/>
+                <a:cs typeface="+mj-cs"/>
+              </a:defRPr>
+            </a:lvl1pPr>
+          </a:lstStyle>
+          <a:p>
+            <a:pPr algn="l"/>
+            <a:r>
+              <a:rPr lang="en-GB" dirty="0">
+                <a:solidFill>
+                  <a:srgbClr val="0070C0"/>
+                </a:solidFill>
+                <a:latin typeface="Ubuntu" panose="020B0504030602030204" pitchFamily="34" charset="0"/>
+                <a:cs typeface="Calibri Light"/>
+              </a:rPr>
+              <a:t>Thank you!</a:t>
+            </a:r>
+          </a:p>
+        </p:txBody>
+      </p:sp>
+      <p:sp>
+        <p:nvSpPr>
+          <p:cNvPr id="31" name="TextBox 30">
+            <a:extLst>
+              <a:ext uri="{FF2B5EF4-FFF2-40B4-BE49-F238E27FC236}">
+                <a16:creationId xmlns:a16="http://schemas.microsoft.com/office/drawing/2014/main" id="{8301C9CE-9242-4726-9F52-06DA0C528C06}"/>
+              </a:ext>
+            </a:extLst>
+          </p:cNvPr>
+          <p:cNvSpPr txBox="1"/>
+          <p:nvPr/>
+        </p:nvSpPr>
+        <p:spPr>
+          <a:xfrm>
+            <a:off x="335360" y="1284724"/>
+            <a:ext cx="11662112" cy="3416320"/>
+          </a:xfrm>
+          <a:prstGeom prst="rect">
+            <a:avLst/>
+          </a:prstGeom>
+          <a:noFill/>
+        </p:spPr>
+        <p:txBody>
+          <a:bodyPr rot="0" spcFirstLastPara="0" vertOverflow="overflow" horzOverflow="overflow" vert="horz" wrap="square" lIns="91440" tIns="45720" rIns="91440" bIns="45720" numCol="1" spcCol="0" rtlCol="0" fromWordArt="0" anchor="t" anchorCtr="0" forceAA="0" compatLnSpc="1">
+            <a:prstTxWarp prst="textNoShape">
+              <a:avLst/>
+            </a:prstTxWarp>
+            <a:spAutoFit/>
+          </a:bodyPr>
+          <a:lstStyle/>
+          <a:p>
+            <a:r>
+              <a:rPr lang="en-US" sz="2400" dirty="0">
+                <a:solidFill>
+                  <a:srgbClr val="0070C0"/>
+                </a:solidFill>
+                <a:latin typeface="Ubuntu" panose="020B0504030602030204" pitchFamily="34" charset="0"/>
+                <a:ea typeface="Calibri"/>
+                <a:cs typeface="Calibri"/>
+              </a:rPr>
+              <a:t>AdventureWorks2019 : </a:t>
+            </a:r>
+            <a:r>
+              <a:rPr lang="en-US" sz="2400" dirty="0">
+                <a:solidFill>
+                  <a:srgbClr val="0070C0"/>
+                </a:solidFill>
+                <a:latin typeface="Ubuntu" panose="020B0504030602030204" pitchFamily="34" charset="0"/>
+                <a:ea typeface="Calibri"/>
+                <a:cs typeface="Calibri"/>
+                <a:hlinkClick r:id="rId3">
+                  <a:extLst>
+                    <a:ext uri="{A12FA001-AC4F-418D-AE19-62706E023703}">
+                      <ahyp:hlinkClr xmlns:ahyp="http://schemas.microsoft.com/office/drawing/2018/hyperlinkcolor" val="tx"/>
+                    </a:ext>
+                  </a:extLst>
+                </a:hlinkClick>
+              </a:rPr>
+              <a:t>https://github.com/Microsoft/sql-server-samples/releases/tag/adventureworks</a:t>
+            </a:r>
+            <a:endParaRPr lang="en-US" sz="2400" dirty="0">
+              <a:solidFill>
+                <a:srgbClr val="0070C0"/>
+              </a:solidFill>
+              <a:latin typeface="Ubuntu" panose="020B0504030602030204" pitchFamily="34" charset="0"/>
+              <a:ea typeface="Calibri"/>
+              <a:cs typeface="Calibri"/>
+            </a:endParaRPr>
+          </a:p>
+          <a:p>
+            <a:endParaRPr lang="en-US" sz="2400" dirty="0">
+              <a:solidFill>
+                <a:srgbClr val="0070C0"/>
+              </a:solidFill>
+              <a:latin typeface="Ubuntu" panose="020B0504030602030204" pitchFamily="34" charset="0"/>
+              <a:cs typeface="Calibri"/>
+              <a:hlinkClick r:id="rId4">
+                <a:extLst>
+                  <a:ext uri="{A12FA001-AC4F-418D-AE19-62706E023703}">
+                    <ahyp:hlinkClr xmlns:ahyp="http://schemas.microsoft.com/office/drawing/2018/hyperlinkcolor" val="tx"/>
+                  </a:ext>
+                </a:extLst>
+              </a:hlinkClick>
+            </a:endParaRPr>
+          </a:p>
+          <a:p>
+            <a:r>
+              <a:rPr lang="en-US" sz="2400" dirty="0">
+                <a:solidFill>
+                  <a:srgbClr val="0070C0"/>
+                </a:solidFill>
+                <a:latin typeface="Ubuntu" panose="020B0504030602030204" pitchFamily="34" charset="0"/>
+                <a:ea typeface="Calibri"/>
+                <a:cs typeface="Calibri"/>
+              </a:rPr>
+              <a:t>Stack Overflow: h</a:t>
+            </a:r>
+            <a:r>
+              <a:rPr lang="en-US" sz="2400" dirty="0">
+                <a:solidFill>
+                  <a:srgbClr val="0070C0"/>
+                </a:solidFill>
+                <a:latin typeface="Ubuntu" panose="020B0504030602030204" pitchFamily="34" charset="0"/>
+                <a:ea typeface="Calibri"/>
+                <a:cs typeface="Calibri"/>
+                <a:hlinkClick r:id="rId5">
+                  <a:extLst>
+                    <a:ext uri="{A12FA001-AC4F-418D-AE19-62706E023703}">
+                      <ahyp:hlinkClr xmlns:ahyp="http://schemas.microsoft.com/office/drawing/2018/hyperlinkcolor" val="tx"/>
+                    </a:ext>
+                  </a:extLst>
+                </a:hlinkClick>
+              </a:rPr>
+              <a:t>ttps://www.brentozar.com/archive/2015/10/how-to-download-the-stack-overflow-database-via-bittorrent</a:t>
+            </a:r>
+            <a:endParaRPr lang="en-US" sz="2400" dirty="0">
+              <a:solidFill>
+                <a:srgbClr val="0070C0"/>
+              </a:solidFill>
+              <a:latin typeface="Ubuntu" panose="020B0504030602030204" pitchFamily="34" charset="0"/>
+              <a:ea typeface="Calibri"/>
+              <a:cs typeface="Calibri"/>
+            </a:endParaRPr>
+          </a:p>
+          <a:p>
+            <a:endParaRPr lang="en-US" sz="2400" dirty="0">
+              <a:solidFill>
+                <a:srgbClr val="0070C0"/>
+              </a:solidFill>
+              <a:latin typeface="Ubuntu" panose="020B0504030602030204" pitchFamily="34" charset="0"/>
+              <a:cs typeface="Calibri"/>
+              <a:hlinkClick r:id="rId4">
+                <a:extLst>
+                  <a:ext uri="{A12FA001-AC4F-418D-AE19-62706E023703}">
+                    <ahyp:hlinkClr xmlns:ahyp="http://schemas.microsoft.com/office/drawing/2018/hyperlinkcolor" val="tx"/>
+                  </a:ext>
+                </a:extLst>
+              </a:hlinkClick>
+            </a:endParaRPr>
+          </a:p>
+          <a:p>
+            <a:r>
+              <a:rPr lang="en-US" sz="2400" dirty="0">
+                <a:solidFill>
+                  <a:srgbClr val="0070C0"/>
+                </a:solidFill>
+                <a:latin typeface="Ubuntu" panose="020B0504030602030204" pitchFamily="34" charset="0"/>
+                <a:cs typeface="Calibri"/>
+                <a:hlinkClick r:id="rId4">
+                  <a:extLst>
+                    <a:ext uri="{A12FA001-AC4F-418D-AE19-62706E023703}">
+                      <ahyp:hlinkClr xmlns:ahyp="http://schemas.microsoft.com/office/drawing/2018/hyperlinkcolor" val="tx"/>
+                    </a:ext>
+                  </a:extLst>
+                </a:hlinkClick>
+              </a:rPr>
+              <a:t>https://github.com/phil-a10/Talks</a:t>
+            </a:r>
+          </a:p>
+          <a:p>
+            <a:endParaRPr lang="en-US" sz="2400" dirty="0">
+              <a:solidFill>
+                <a:srgbClr val="0070C0"/>
+              </a:solidFill>
+              <a:latin typeface="Ubuntu" panose="020B0504030602030204" pitchFamily="34" charset="0"/>
+              <a:cs typeface="Calibri"/>
+              <a:hlinkClick r:id="rId4">
+                <a:extLst>
+                  <a:ext uri="{A12FA001-AC4F-418D-AE19-62706E023703}">
+                    <ahyp:hlinkClr xmlns:ahyp="http://schemas.microsoft.com/office/drawing/2018/hyperlinkcolor" val="tx"/>
+                  </a:ext>
+                </a:extLst>
+              </a:hlinkClick>
+            </a:endParaRPr>
+          </a:p>
+          <a:p>
+            <a:endParaRPr lang="en-US" sz="2400" dirty="0">
+              <a:solidFill>
+                <a:srgbClr val="0070C0"/>
+              </a:solidFill>
+              <a:latin typeface="Ubuntu" panose="020B0504030602030204" pitchFamily="34" charset="0"/>
+              <a:cs typeface="Calibri"/>
+            </a:endParaRPr>
+          </a:p>
+        </p:txBody>
+      </p:sp>
+      <p:sp>
+        <p:nvSpPr>
+          <p:cNvPr id="32" name="TextBox 31">
+            <a:extLst>
+              <a:ext uri="{FF2B5EF4-FFF2-40B4-BE49-F238E27FC236}">
+                <a16:creationId xmlns:a16="http://schemas.microsoft.com/office/drawing/2014/main" id="{2FE46D38-0D8D-4F84-9CC9-31A7F1D064D6}"/>
+              </a:ext>
+            </a:extLst>
+          </p:cNvPr>
+          <p:cNvSpPr txBox="1"/>
+          <p:nvPr/>
+        </p:nvSpPr>
+        <p:spPr>
+          <a:xfrm>
+            <a:off x="335360" y="4193212"/>
+            <a:ext cx="6097022" cy="1015663"/>
+          </a:xfrm>
+          <a:prstGeom prst="rect">
+            <a:avLst/>
+          </a:prstGeom>
+          <a:noFill/>
+        </p:spPr>
+        <p:txBody>
+          <a:bodyPr wrap="square">
+            <a:spAutoFit/>
+          </a:bodyPr>
+          <a:lstStyle/>
+          <a:p>
+            <a:r>
+              <a:rPr lang="en-GB" sz="6000" dirty="0">
+                <a:solidFill>
+                  <a:srgbClr val="0070C0"/>
+                </a:solidFill>
+                <a:latin typeface="Ubuntu" panose="020B0504030602030204" pitchFamily="34" charset="0"/>
+                <a:cs typeface="Calibri Light"/>
+              </a:rPr>
+              <a:t>Questions?</a:t>
+            </a:r>
+          </a:p>
+        </p:txBody>
+      </p:sp>
+      <p:sp>
+        <p:nvSpPr>
+          <p:cNvPr id="3" name="TextBox 2">
+            <a:extLst>
+              <a:ext uri="{FF2B5EF4-FFF2-40B4-BE49-F238E27FC236}">
+                <a16:creationId xmlns:a16="http://schemas.microsoft.com/office/drawing/2014/main" id="{A7FCCC61-C6D2-6923-1033-1DA066BCF291}"/>
+              </a:ext>
+            </a:extLst>
+          </p:cNvPr>
+          <p:cNvSpPr txBox="1"/>
+          <p:nvPr/>
+        </p:nvSpPr>
+        <p:spPr>
+          <a:xfrm>
+            <a:off x="335360" y="5207758"/>
+            <a:ext cx="6179870" cy="1200329"/>
+          </a:xfrm>
+          <a:prstGeom prst="rect">
+            <a:avLst/>
+          </a:prstGeom>
+          <a:noFill/>
+        </p:spPr>
+        <p:txBody>
+          <a:bodyPr wrap="square">
+            <a:spAutoFit/>
+          </a:bodyPr>
+          <a:lstStyle/>
+          <a:p>
+            <a:r>
+              <a:rPr lang="en-US" sz="2400" dirty="0">
+                <a:solidFill>
+                  <a:srgbClr val="0070C0"/>
+                </a:solidFill>
+                <a:latin typeface="Ubuntu" panose="020B0504030602030204" pitchFamily="34" charset="0"/>
+                <a:cs typeface="Calibri"/>
+                <a:hlinkClick r:id="rId4">
+                  <a:extLst>
+                    <a:ext uri="{A12FA001-AC4F-418D-AE19-62706E023703}">
+                      <ahyp:hlinkClr xmlns:ahyp="http://schemas.microsoft.com/office/drawing/2018/hyperlinkcolor" val="tx"/>
+                    </a:ext>
+                  </a:extLst>
+                </a:hlinkClick>
+              </a:rPr>
+              <a:t>phil.austin@adatis.co.uk</a:t>
+            </a:r>
+            <a:endParaRPr lang="en-US" sz="2400" dirty="0">
+              <a:solidFill>
+                <a:srgbClr val="0070C0"/>
+              </a:solidFill>
+              <a:latin typeface="Ubuntu" panose="020B0504030602030204" pitchFamily="34" charset="0"/>
+              <a:cs typeface="Calibri Light"/>
+            </a:endParaRPr>
+          </a:p>
+          <a:p>
+            <a:endParaRPr lang="en-US" sz="2400" dirty="0">
+              <a:solidFill>
+                <a:srgbClr val="0070C0"/>
+              </a:solidFill>
+              <a:latin typeface="Ubuntu" panose="020B0504030602030204" pitchFamily="34" charset="0"/>
+              <a:cs typeface="Calibri"/>
+            </a:endParaRPr>
+          </a:p>
+          <a:p>
+            <a:r>
+              <a:rPr lang="en-US" sz="2400" dirty="0">
+                <a:solidFill>
+                  <a:srgbClr val="0070C0"/>
+                </a:solidFill>
+                <a:latin typeface="Ubuntu" panose="020B0504030602030204" pitchFamily="34" charset="0"/>
+                <a:ea typeface="+mn-lt"/>
+                <a:cs typeface="+mn-lt"/>
+              </a:rPr>
+              <a:t>www.linkedin.com/in/phil-austin-44147415</a:t>
+            </a:r>
+            <a:endParaRPr lang="en-US" sz="2400" dirty="0">
+              <a:solidFill>
+                <a:srgbClr val="0070C0"/>
+              </a:solidFill>
+              <a:latin typeface="Ubuntu" panose="020B0504030602030204" pitchFamily="34" charset="0"/>
+              <a:cs typeface="Calibri Light"/>
+            </a:endParaRPr>
+          </a:p>
+        </p:txBody>
+      </p:sp>
+    </p:spTree>
+    <p:extLst>
+      <p:ext uri="{BB962C8B-B14F-4D97-AF65-F5344CB8AC3E}">
+        <p14:creationId xmlns:p14="http://schemas.microsoft.com/office/powerpoint/2010/main" val="1232180620"/>
+      </p:ext>
+    </p:extLst>
+  </p:cSld>
+  <p:clrMapOvr>
+    <a:masterClrMapping/>
+  </p:clrMapOvr>
+</p:sld>
+</file>
+
+<file path=ppt/slides/slide7.xml><?xml version="1.0" encoding="utf-8"?>
 <p:sld xmlns:a="http://schemas.openxmlformats.org/drawingml/2006/main" xmlns:r="http://schemas.openxmlformats.org/officeDocument/2006/relationships" xmlns:p="http://schemas.openxmlformats.org/presentationml/2006/main">
   <p:cSld>
     <p:spTree>
@@ -8152,21 +8591,6 @@
 </file>
 
 <file path=customXml/item1.xml><?xml version="1.0" encoding="utf-8"?>
-<?mso-contentType ?>
-<FormTemplates xmlns="http://schemas.microsoft.com/sharepoint/v3/contenttype/forms">
-  <Display>DocumentLibraryForm</Display>
-  <Edit>DocumentLibraryForm</Edit>
-  <New>DocumentLibraryForm</New>
-</FormTemplates>
-</file>
-
-<file path=customXml/item2.xml><?xml version="1.0" encoding="utf-8"?>
-<p:properties xmlns:p="http://schemas.microsoft.com/office/2006/metadata/properties" xmlns:xsi="http://www.w3.org/2001/XMLSchema-instance" xmlns:pc="http://schemas.microsoft.com/office/infopath/2007/PartnerControls">
-  <documentManagement/>
-</p:properties>
-</file>
-
-<file path=customXml/item3.xml><?xml version="1.0" encoding="utf-8"?>
 <ct:contentTypeSchema xmlns:ct="http://schemas.microsoft.com/office/2006/metadata/contentType" xmlns:ma="http://schemas.microsoft.com/office/2006/metadata/properties/metaAttributes" ct:_="" ma:_="" ma:contentTypeName="Document" ma:contentTypeID="0x010100FBB1B5EA396249469A265E2AFFA3D1CF" ma:contentTypeVersion="13" ma:contentTypeDescription="Create a new document." ma:contentTypeScope="" ma:versionID="b141d291728b83a8fcc03a75883dd331">
   <xsd:schema xmlns:xsd="http://www.w3.org/2001/XMLSchema" xmlns:xs="http://www.w3.org/2001/XMLSchema" xmlns:p="http://schemas.microsoft.com/office/2006/metadata/properties" xmlns:ns2="8ec32435-9101-4c97-8a3c-ccfc4b09d27a" xmlns:ns3="b8fcd98d-34a5-443c-9231-e77d014cc831" targetNamespace="http://schemas.microsoft.com/office/2006/metadata/properties" ma:root="true" ma:fieldsID="34a7861a6873264f6183a02b9797b2f1" ns2:_="" ns3:_="">
     <xsd:import namespace="8ec32435-9101-4c97-8a3c-ccfc4b09d27a"/>
@@ -8389,10 +8813,36 @@
 </ct:contentTypeSchema>
 </file>
 
+<file path=customXml/item2.xml><?xml version="1.0" encoding="utf-8"?>
+<p:properties xmlns:p="http://schemas.microsoft.com/office/2006/metadata/properties" xmlns:xsi="http://www.w3.org/2001/XMLSchema-instance" xmlns:pc="http://schemas.microsoft.com/office/infopath/2007/PartnerControls">
+  <documentManagement/>
+</p:properties>
+</file>
+
+<file path=customXml/item3.xml><?xml version="1.0" encoding="utf-8"?>
+<?mso-contentType ?>
+<FormTemplates xmlns="http://schemas.microsoft.com/sharepoint/v3/contenttype/forms">
+  <Display>DocumentLibraryForm</Display>
+  <Edit>DocumentLibraryForm</Edit>
+  <New>DocumentLibraryForm</New>
+</FormTemplates>
+</file>
+
 <file path=customXml/itemProps1.xml><?xml version="1.0" encoding="utf-8"?>
-<ds:datastoreItem xmlns:ds="http://schemas.openxmlformats.org/officeDocument/2006/customXml" ds:itemID="{2CB33670-BA4C-497A-82C4-7472D857EF72}">
+<ds:datastoreItem xmlns:ds="http://schemas.openxmlformats.org/officeDocument/2006/customXml" ds:itemID="{3DF60798-9B04-43FD-B5B0-24F9F1212BF9}">
   <ds:schemaRefs>
-    <ds:schemaRef ds:uri="http://schemas.microsoft.com/sharepoint/v3/contenttype/forms"/>
+    <ds:schemaRef ds:uri="8ec32435-9101-4c97-8a3c-ccfc4b09d27a"/>
+    <ds:schemaRef ds:uri="b8fcd98d-34a5-443c-9231-e77d014cc831"/>
+    <ds:schemaRef ds:uri="http://purl.org/dc/elements/1.1/"/>
+    <ds:schemaRef ds:uri="http://purl.org/dc/terms/"/>
+    <ds:schemaRef ds:uri="http://schemas.microsoft.com/internal/obd"/>
+    <ds:schemaRef ds:uri="http://schemas.microsoft.com/office/2006/documentManagement/types"/>
+    <ds:schemaRef ds:uri="http://schemas.microsoft.com/office/2006/metadata/contentType"/>
+    <ds:schemaRef ds:uri="http://schemas.microsoft.com/office/2006/metadata/properties"/>
+    <ds:schemaRef ds:uri="http://schemas.microsoft.com/office/2006/metadata/properties/metaAttributes"/>
+    <ds:schemaRef ds:uri="http://schemas.microsoft.com/office/infopath/2007/PartnerControls"/>
+    <ds:schemaRef ds:uri="http://schemas.openxmlformats.org/package/2006/metadata/core-properties"/>
+    <ds:schemaRef ds:uri="http://www.w3.org/2001/XMLSchema"/>
   </ds:schemaRefs>
 </ds:datastoreItem>
 </file>
@@ -8415,20 +8865,9 @@
 </file>
 
 <file path=customXml/itemProps3.xml><?xml version="1.0" encoding="utf-8"?>
-<ds:datastoreItem xmlns:ds="http://schemas.openxmlformats.org/officeDocument/2006/customXml" ds:itemID="{3DF60798-9B04-43FD-B5B0-24F9F1212BF9}">
+<ds:datastoreItem xmlns:ds="http://schemas.openxmlformats.org/officeDocument/2006/customXml" ds:itemID="{2CB33670-BA4C-497A-82C4-7472D857EF72}">
   <ds:schemaRefs>
-    <ds:schemaRef ds:uri="8ec32435-9101-4c97-8a3c-ccfc4b09d27a"/>
-    <ds:schemaRef ds:uri="b8fcd98d-34a5-443c-9231-e77d014cc831"/>
-    <ds:schemaRef ds:uri="http://purl.org/dc/elements/1.1/"/>
-    <ds:schemaRef ds:uri="http://purl.org/dc/terms/"/>
-    <ds:schemaRef ds:uri="http://schemas.microsoft.com/internal/obd"/>
-    <ds:schemaRef ds:uri="http://schemas.microsoft.com/office/2006/documentManagement/types"/>
-    <ds:schemaRef ds:uri="http://schemas.microsoft.com/office/2006/metadata/contentType"/>
-    <ds:schemaRef ds:uri="http://schemas.microsoft.com/office/2006/metadata/properties"/>
-    <ds:schemaRef ds:uri="http://schemas.microsoft.com/office/2006/metadata/properties/metaAttributes"/>
-    <ds:schemaRef ds:uri="http://schemas.microsoft.com/office/infopath/2007/PartnerControls"/>
-    <ds:schemaRef ds:uri="http://schemas.openxmlformats.org/package/2006/metadata/core-properties"/>
-    <ds:schemaRef ds:uri="http://www.w3.org/2001/XMLSchema"/>
+    <ds:schemaRef ds:uri="http://schemas.microsoft.com/sharepoint/v3/contenttype/forms"/>
   </ds:schemaRefs>
 </ds:datastoreItem>
 </file>
</xml_diff>

<commit_message>
Adding exercises and demos to fundamentals talk
</commit_message>
<xml_diff>
--- a/SQL Query Long Talk/Adatis/SQL Query Talk.pptx
+++ b/SQL Query Long Talk/Adatis/SQL Query Talk.pptx
@@ -267,7 +267,7 @@
           <a:p>
             <a:fld id="{DE126399-7E51-4369-B6E4-E2FF6F9ABB13}" type="datetimeFigureOut">
               <a:rPr lang="en-GB" smtClean="0"/>
-              <a:t>05/12/2022</a:t>
+              <a:t>09/02/2023</a:t>
             </a:fld>
             <a:endParaRPr lang="en-GB"/>
           </a:p>
@@ -684,7 +684,7 @@
           <a:p>
             <a:fld id="{97C62E4C-047F-4BB8-A7D6-928F0B6097C5}" type="datetimeFigureOut">
               <a:rPr lang="en-GB" smtClean="0"/>
-              <a:t>05/12/2022</a:t>
+              <a:t>09/02/2023</a:t>
             </a:fld>
             <a:endParaRPr lang="en-GB"/>
           </a:p>
@@ -884,7 +884,7 @@
           <a:p>
             <a:fld id="{97C62E4C-047F-4BB8-A7D6-928F0B6097C5}" type="datetimeFigureOut">
               <a:rPr lang="en-GB" smtClean="0"/>
-              <a:t>05/12/2022</a:t>
+              <a:t>09/02/2023</a:t>
             </a:fld>
             <a:endParaRPr lang="en-GB"/>
           </a:p>
@@ -1094,7 +1094,7 @@
           <a:p>
             <a:fld id="{97C62E4C-047F-4BB8-A7D6-928F0B6097C5}" type="datetimeFigureOut">
               <a:rPr lang="en-GB" smtClean="0"/>
-              <a:t>05/12/2022</a:t>
+              <a:t>09/02/2023</a:t>
             </a:fld>
             <a:endParaRPr lang="en-GB"/>
           </a:p>
@@ -1294,7 +1294,7 @@
           <a:p>
             <a:fld id="{97C62E4C-047F-4BB8-A7D6-928F0B6097C5}" type="datetimeFigureOut">
               <a:rPr lang="en-GB" smtClean="0"/>
-              <a:t>05/12/2022</a:t>
+              <a:t>09/02/2023</a:t>
             </a:fld>
             <a:endParaRPr lang="en-GB"/>
           </a:p>
@@ -1570,7 +1570,7 @@
           <a:p>
             <a:fld id="{97C62E4C-047F-4BB8-A7D6-928F0B6097C5}" type="datetimeFigureOut">
               <a:rPr lang="en-GB" smtClean="0"/>
-              <a:t>05/12/2022</a:t>
+              <a:t>09/02/2023</a:t>
             </a:fld>
             <a:endParaRPr lang="en-GB"/>
           </a:p>
@@ -1838,7 +1838,7 @@
           <a:p>
             <a:fld id="{97C62E4C-047F-4BB8-A7D6-928F0B6097C5}" type="datetimeFigureOut">
               <a:rPr lang="en-GB" smtClean="0"/>
-              <a:t>05/12/2022</a:t>
+              <a:t>09/02/2023</a:t>
             </a:fld>
             <a:endParaRPr lang="en-GB"/>
           </a:p>
@@ -2253,7 +2253,7 @@
           <a:p>
             <a:fld id="{97C62E4C-047F-4BB8-A7D6-928F0B6097C5}" type="datetimeFigureOut">
               <a:rPr lang="en-GB" smtClean="0"/>
-              <a:t>05/12/2022</a:t>
+              <a:t>09/02/2023</a:t>
             </a:fld>
             <a:endParaRPr lang="en-GB"/>
           </a:p>
@@ -2395,7 +2395,7 @@
           <a:p>
             <a:fld id="{97C62E4C-047F-4BB8-A7D6-928F0B6097C5}" type="datetimeFigureOut">
               <a:rPr lang="en-GB" smtClean="0"/>
-              <a:t>05/12/2022</a:t>
+              <a:t>09/02/2023</a:t>
             </a:fld>
             <a:endParaRPr lang="en-GB"/>
           </a:p>
@@ -2508,7 +2508,7 @@
           <a:p>
             <a:fld id="{97C62E4C-047F-4BB8-A7D6-928F0B6097C5}" type="datetimeFigureOut">
               <a:rPr lang="en-GB" smtClean="0"/>
-              <a:t>05/12/2022</a:t>
+              <a:t>09/02/2023</a:t>
             </a:fld>
             <a:endParaRPr lang="en-GB"/>
           </a:p>
@@ -2821,7 +2821,7 @@
           <a:p>
             <a:fld id="{97C62E4C-047F-4BB8-A7D6-928F0B6097C5}" type="datetimeFigureOut">
               <a:rPr lang="en-GB" smtClean="0"/>
-              <a:t>05/12/2022</a:t>
+              <a:t>09/02/2023</a:t>
             </a:fld>
             <a:endParaRPr lang="en-GB"/>
           </a:p>
@@ -3114,7 +3114,7 @@
           <a:p>
             <a:fld id="{97C62E4C-047F-4BB8-A7D6-928F0B6097C5}" type="datetimeFigureOut">
               <a:rPr lang="en-GB" smtClean="0"/>
-              <a:t>05/12/2022</a:t>
+              <a:t>09/02/2023</a:t>
             </a:fld>
             <a:endParaRPr lang="en-GB"/>
           </a:p>
@@ -3357,7 +3357,7 @@
           <a:p>
             <a:fld id="{97C62E4C-047F-4BB8-A7D6-928F0B6097C5}" type="datetimeFigureOut">
               <a:rPr lang="en-GB" smtClean="0"/>
-              <a:t>05/12/2022</a:t>
+              <a:t>09/02/2023</a:t>
             </a:fld>
             <a:endParaRPr lang="en-GB"/>
           </a:p>
@@ -4690,10 +4690,6 @@
             </a:r>
           </a:p>
           <a:p>
-            <a:pPr marL="514350" indent="-514350">
-              <a:buFont typeface="+mj-lt"/>
-              <a:buAutoNum type="arabicPeriod"/>
-            </a:pPr>
             <a:r>
               <a:rPr lang="en-US" sz="2800" dirty="0">
                 <a:solidFill>
@@ -4702,14 +4698,10 @@
                   </a:schemeClr>
                 </a:solidFill>
               </a:rPr>
-              <a:t>DISTINCTs</a:t>
-            </a:r>
-          </a:p>
-          <a:p>
-            <a:pPr marL="514350" indent="-514350">
-              <a:buFont typeface="+mj-lt"/>
-              <a:buAutoNum type="arabicPeriod"/>
-            </a:pPr>
+              <a:t>5.   DISTINCTs</a:t>
+            </a:r>
+          </a:p>
+          <a:p>
             <a:r>
               <a:rPr lang="en-US" sz="2800" dirty="0">
                 <a:solidFill>
@@ -4718,14 +4710,10 @@
                   </a:schemeClr>
                 </a:solidFill>
               </a:rPr>
-              <a:t>MAX vs RANK</a:t>
-            </a:r>
-          </a:p>
-          <a:p>
-            <a:pPr marL="514350" indent="-514350">
-              <a:buFont typeface="+mj-lt"/>
-              <a:buAutoNum type="arabicPeriod"/>
-            </a:pPr>
+              <a:t>6.   MAX vs RANK</a:t>
+            </a:r>
+          </a:p>
+          <a:p>
             <a:r>
               <a:rPr lang="en-US" sz="2800" dirty="0">
                 <a:solidFill>
@@ -4734,14 +4722,20 @@
                   </a:schemeClr>
                 </a:solidFill>
               </a:rPr>
-              <a:t>Many joins/complex queries</a:t>
-            </a:r>
-          </a:p>
-          <a:p>
-            <a:pPr marL="514350" indent="-514350">
-              <a:buFont typeface="+mj-lt"/>
-              <a:buAutoNum type="arabicPeriod"/>
-            </a:pPr>
+              <a:t>7.   Many joins/complex queries</a:t>
+            </a:r>
+          </a:p>
+          <a:p>
+            <a:r>
+              <a:rPr lang="en-US" sz="2800" dirty="0">
+                <a:solidFill>
+                  <a:schemeClr val="accent1">
+                    <a:lumMod val="75000"/>
+                  </a:schemeClr>
+                </a:solidFill>
+              </a:rPr>
+              <a:t>8.   </a:t>
+            </a:r>
             <a:r>
               <a:rPr lang="en-US" sz="2800" dirty="0" err="1">
                 <a:solidFill>
@@ -4761,10 +4755,6 @@
             </a:endParaRPr>
           </a:p>
           <a:p>
-            <a:pPr marL="514350" indent="-514350">
-              <a:buFont typeface="+mj-lt"/>
-              <a:buAutoNum type="arabicPeriod"/>
-            </a:pPr>
             <a:r>
               <a:rPr lang="en-US" sz="2800" dirty="0">
                 <a:solidFill>
@@ -4773,7 +4763,7 @@
                   </a:schemeClr>
                 </a:solidFill>
               </a:rPr>
-              <a:t>MAXDOP</a:t>
+              <a:t>9.   MAXDOP</a:t>
             </a:r>
           </a:p>
         </p:txBody>
@@ -8591,6 +8581,21 @@
 </file>
 
 <file path=customXml/item1.xml><?xml version="1.0" encoding="utf-8"?>
+<?mso-contentType ?>
+<FormTemplates xmlns="http://schemas.microsoft.com/sharepoint/v3/contenttype/forms">
+  <Display>DocumentLibraryForm</Display>
+  <Edit>DocumentLibraryForm</Edit>
+  <New>DocumentLibraryForm</New>
+</FormTemplates>
+</file>
+
+<file path=customXml/item2.xml><?xml version="1.0" encoding="utf-8"?>
+<p:properties xmlns:p="http://schemas.microsoft.com/office/2006/metadata/properties" xmlns:xsi="http://www.w3.org/2001/XMLSchema-instance" xmlns:pc="http://schemas.microsoft.com/office/infopath/2007/PartnerControls">
+  <documentManagement/>
+</p:properties>
+</file>
+
+<file path=customXml/item3.xml><?xml version="1.0" encoding="utf-8"?>
 <ct:contentTypeSchema xmlns:ct="http://schemas.microsoft.com/office/2006/metadata/contentType" xmlns:ma="http://schemas.microsoft.com/office/2006/metadata/properties/metaAttributes" ct:_="" ma:_="" ma:contentTypeName="Document" ma:contentTypeID="0x010100FBB1B5EA396249469A265E2AFFA3D1CF" ma:contentTypeVersion="13" ma:contentTypeDescription="Create a new document." ma:contentTypeScope="" ma:versionID="b141d291728b83a8fcc03a75883dd331">
   <xsd:schema xmlns:xsd="http://www.w3.org/2001/XMLSchema" xmlns:xs="http://www.w3.org/2001/XMLSchema" xmlns:p="http://schemas.microsoft.com/office/2006/metadata/properties" xmlns:ns2="8ec32435-9101-4c97-8a3c-ccfc4b09d27a" xmlns:ns3="b8fcd98d-34a5-443c-9231-e77d014cc831" targetNamespace="http://schemas.microsoft.com/office/2006/metadata/properties" ma:root="true" ma:fieldsID="34a7861a6873264f6183a02b9797b2f1" ns2:_="" ns3:_="">
     <xsd:import namespace="8ec32435-9101-4c97-8a3c-ccfc4b09d27a"/>
@@ -8813,36 +8818,10 @@
 </ct:contentTypeSchema>
 </file>
 
-<file path=customXml/item2.xml><?xml version="1.0" encoding="utf-8"?>
-<p:properties xmlns:p="http://schemas.microsoft.com/office/2006/metadata/properties" xmlns:xsi="http://www.w3.org/2001/XMLSchema-instance" xmlns:pc="http://schemas.microsoft.com/office/infopath/2007/PartnerControls">
-  <documentManagement/>
-</p:properties>
-</file>
-
-<file path=customXml/item3.xml><?xml version="1.0" encoding="utf-8"?>
-<?mso-contentType ?>
-<FormTemplates xmlns="http://schemas.microsoft.com/sharepoint/v3/contenttype/forms">
-  <Display>DocumentLibraryForm</Display>
-  <Edit>DocumentLibraryForm</Edit>
-  <New>DocumentLibraryForm</New>
-</FormTemplates>
-</file>
-
 <file path=customXml/itemProps1.xml><?xml version="1.0" encoding="utf-8"?>
-<ds:datastoreItem xmlns:ds="http://schemas.openxmlformats.org/officeDocument/2006/customXml" ds:itemID="{3DF60798-9B04-43FD-B5B0-24F9F1212BF9}">
+<ds:datastoreItem xmlns:ds="http://schemas.openxmlformats.org/officeDocument/2006/customXml" ds:itemID="{2CB33670-BA4C-497A-82C4-7472D857EF72}">
   <ds:schemaRefs>
-    <ds:schemaRef ds:uri="8ec32435-9101-4c97-8a3c-ccfc4b09d27a"/>
-    <ds:schemaRef ds:uri="b8fcd98d-34a5-443c-9231-e77d014cc831"/>
-    <ds:schemaRef ds:uri="http://purl.org/dc/elements/1.1/"/>
-    <ds:schemaRef ds:uri="http://purl.org/dc/terms/"/>
-    <ds:schemaRef ds:uri="http://schemas.microsoft.com/internal/obd"/>
-    <ds:schemaRef ds:uri="http://schemas.microsoft.com/office/2006/documentManagement/types"/>
-    <ds:schemaRef ds:uri="http://schemas.microsoft.com/office/2006/metadata/contentType"/>
-    <ds:schemaRef ds:uri="http://schemas.microsoft.com/office/2006/metadata/properties"/>
-    <ds:schemaRef ds:uri="http://schemas.microsoft.com/office/2006/metadata/properties/metaAttributes"/>
-    <ds:schemaRef ds:uri="http://schemas.microsoft.com/office/infopath/2007/PartnerControls"/>
-    <ds:schemaRef ds:uri="http://schemas.openxmlformats.org/package/2006/metadata/core-properties"/>
-    <ds:schemaRef ds:uri="http://www.w3.org/2001/XMLSchema"/>
+    <ds:schemaRef ds:uri="http://schemas.microsoft.com/sharepoint/v3/contenttype/forms"/>
   </ds:schemaRefs>
 </ds:datastoreItem>
 </file>
@@ -8865,9 +8844,20 @@
 </file>
 
 <file path=customXml/itemProps3.xml><?xml version="1.0" encoding="utf-8"?>
-<ds:datastoreItem xmlns:ds="http://schemas.openxmlformats.org/officeDocument/2006/customXml" ds:itemID="{2CB33670-BA4C-497A-82C4-7472D857EF72}">
+<ds:datastoreItem xmlns:ds="http://schemas.openxmlformats.org/officeDocument/2006/customXml" ds:itemID="{3DF60798-9B04-43FD-B5B0-24F9F1212BF9}">
   <ds:schemaRefs>
-    <ds:schemaRef ds:uri="http://schemas.microsoft.com/sharepoint/v3/contenttype/forms"/>
+    <ds:schemaRef ds:uri="8ec32435-9101-4c97-8a3c-ccfc4b09d27a"/>
+    <ds:schemaRef ds:uri="b8fcd98d-34a5-443c-9231-e77d014cc831"/>
+    <ds:schemaRef ds:uri="http://purl.org/dc/elements/1.1/"/>
+    <ds:schemaRef ds:uri="http://purl.org/dc/terms/"/>
+    <ds:schemaRef ds:uri="http://schemas.microsoft.com/internal/obd"/>
+    <ds:schemaRef ds:uri="http://schemas.microsoft.com/office/2006/documentManagement/types"/>
+    <ds:schemaRef ds:uri="http://schemas.microsoft.com/office/2006/metadata/contentType"/>
+    <ds:schemaRef ds:uri="http://schemas.microsoft.com/office/2006/metadata/properties"/>
+    <ds:schemaRef ds:uri="http://schemas.microsoft.com/office/2006/metadata/properties/metaAttributes"/>
+    <ds:schemaRef ds:uri="http://schemas.microsoft.com/office/infopath/2007/PartnerControls"/>
+    <ds:schemaRef ds:uri="http://schemas.openxmlformats.org/package/2006/metadata/core-properties"/>
+    <ds:schemaRef ds:uri="http://www.w3.org/2001/XMLSchema"/>
   </ds:schemaRefs>
 </ds:datastoreItem>
 </file>
</xml_diff>